<commit_message>
update power point file
</commit_message>
<xml_diff>
--- a/Wache-Market.pptx
+++ b/Wache-Market.pptx
@@ -11,27 +11,35 @@
     <p:sldId id="259" r:id="rId5"/>
     <p:sldId id="260" r:id="rId6"/>
     <p:sldId id="261" r:id="rId7"/>
-    <p:sldId id="262" r:id="rId8"/>
-    <p:sldId id="263" r:id="rId9"/>
-    <p:sldId id="264" r:id="rId10"/>
-    <p:sldId id="265" r:id="rId11"/>
-    <p:sldId id="266" r:id="rId12"/>
-    <p:sldId id="267" r:id="rId13"/>
-    <p:sldId id="268" r:id="rId14"/>
-    <p:sldId id="269" r:id="rId15"/>
-    <p:sldId id="270" r:id="rId16"/>
-    <p:sldId id="271" r:id="rId17"/>
-    <p:sldId id="272" r:id="rId18"/>
-    <p:sldId id="273" r:id="rId19"/>
-    <p:sldId id="274" r:id="rId20"/>
-    <p:sldId id="275" r:id="rId21"/>
-    <p:sldId id="276" r:id="rId22"/>
-    <p:sldId id="277" r:id="rId23"/>
-    <p:sldId id="278" r:id="rId24"/>
-    <p:sldId id="279" r:id="rId25"/>
-    <p:sldId id="280" r:id="rId26"/>
-    <p:sldId id="281" r:id="rId27"/>
-    <p:sldId id="282" r:id="rId28"/>
+    <p:sldId id="284" r:id="rId8"/>
+    <p:sldId id="285" r:id="rId9"/>
+    <p:sldId id="286" r:id="rId10"/>
+    <p:sldId id="262" r:id="rId11"/>
+    <p:sldId id="287" r:id="rId12"/>
+    <p:sldId id="288" r:id="rId13"/>
+    <p:sldId id="263" r:id="rId14"/>
+    <p:sldId id="264" r:id="rId15"/>
+    <p:sldId id="265" r:id="rId16"/>
+    <p:sldId id="266" r:id="rId17"/>
+    <p:sldId id="267" r:id="rId18"/>
+    <p:sldId id="268" r:id="rId19"/>
+    <p:sldId id="289" r:id="rId20"/>
+    <p:sldId id="290" r:id="rId21"/>
+    <p:sldId id="269" r:id="rId22"/>
+    <p:sldId id="270" r:id="rId23"/>
+    <p:sldId id="271" r:id="rId24"/>
+    <p:sldId id="272" r:id="rId25"/>
+    <p:sldId id="273" r:id="rId26"/>
+    <p:sldId id="274" r:id="rId27"/>
+    <p:sldId id="275" r:id="rId28"/>
+    <p:sldId id="276" r:id="rId29"/>
+    <p:sldId id="277" r:id="rId30"/>
+    <p:sldId id="278" r:id="rId31"/>
+    <p:sldId id="279" r:id="rId32"/>
+    <p:sldId id="280" r:id="rId33"/>
+    <p:sldId id="281" r:id="rId34"/>
+    <p:sldId id="282" r:id="rId35"/>
+    <p:sldId id="283" r:id="rId36"/>
   </p:sldIdLst>
   <p:sldSz cx="9144000" cy="6858000" type="screen4x3"/>
   <p:notesSz cx="6858000" cy="9144000"/>
@@ -316,7 +324,7 @@
               <a:rPr lang="en-US" smtClean="0"/>
               <a:t>5/15/2025</a:t>
             </a:fld>
-            <a:endParaRPr lang="en-US"/>
+            <a:endParaRPr lang="en-US" dirty="0"/>
           </a:p>
         </p:txBody>
       </p:sp>
@@ -335,7 +343,7 @@
           <a:bodyPr/>
           <a:lstStyle/>
           <a:p>
-            <a:endParaRPr lang="en-US"/>
+            <a:endParaRPr lang="en-US" dirty="0"/>
           </a:p>
         </p:txBody>
       </p:sp>
@@ -358,7 +366,7 @@
               <a:rPr lang="en-US" smtClean="0"/>
               <a:t>‹#›</a:t>
             </a:fld>
-            <a:endParaRPr lang="en-US"/>
+            <a:endParaRPr lang="en-US" dirty="0"/>
           </a:p>
         </p:txBody>
       </p:sp>
@@ -486,7 +494,7 @@
               <a:rPr lang="en-US" smtClean="0"/>
               <a:t>5/15/2025</a:t>
             </a:fld>
-            <a:endParaRPr lang="en-US"/>
+            <a:endParaRPr lang="en-US" dirty="0"/>
           </a:p>
         </p:txBody>
       </p:sp>
@@ -505,7 +513,7 @@
           <a:bodyPr/>
           <a:lstStyle/>
           <a:p>
-            <a:endParaRPr lang="en-US"/>
+            <a:endParaRPr lang="en-US" dirty="0"/>
           </a:p>
         </p:txBody>
       </p:sp>
@@ -528,7 +536,7 @@
               <a:rPr lang="en-US" smtClean="0"/>
               <a:t>‹#›</a:t>
             </a:fld>
-            <a:endParaRPr lang="en-US"/>
+            <a:endParaRPr lang="en-US" dirty="0"/>
           </a:p>
         </p:txBody>
       </p:sp>
@@ -666,7 +674,7 @@
               <a:rPr lang="en-US" smtClean="0"/>
               <a:t>5/15/2025</a:t>
             </a:fld>
-            <a:endParaRPr lang="en-US"/>
+            <a:endParaRPr lang="en-US" dirty="0"/>
           </a:p>
         </p:txBody>
       </p:sp>
@@ -685,7 +693,7 @@
           <a:bodyPr/>
           <a:lstStyle/>
           <a:p>
-            <a:endParaRPr lang="en-US"/>
+            <a:endParaRPr lang="en-US" dirty="0"/>
           </a:p>
         </p:txBody>
       </p:sp>
@@ -708,7 +716,7 @@
               <a:rPr lang="en-US" smtClean="0"/>
               <a:t>‹#›</a:t>
             </a:fld>
-            <a:endParaRPr lang="en-US"/>
+            <a:endParaRPr lang="en-US" dirty="0"/>
           </a:p>
         </p:txBody>
       </p:sp>
@@ -836,7 +844,7 @@
               <a:rPr lang="en-US" smtClean="0"/>
               <a:t>5/15/2025</a:t>
             </a:fld>
-            <a:endParaRPr lang="en-US"/>
+            <a:endParaRPr lang="en-US" dirty="0"/>
           </a:p>
         </p:txBody>
       </p:sp>
@@ -855,7 +863,7 @@
           <a:bodyPr/>
           <a:lstStyle/>
           <a:p>
-            <a:endParaRPr lang="en-US"/>
+            <a:endParaRPr lang="en-US" dirty="0"/>
           </a:p>
         </p:txBody>
       </p:sp>
@@ -878,7 +886,7 @@
               <a:rPr lang="en-US" smtClean="0"/>
               <a:t>‹#›</a:t>
             </a:fld>
-            <a:endParaRPr lang="en-US"/>
+            <a:endParaRPr lang="en-US" dirty="0"/>
           </a:p>
         </p:txBody>
       </p:sp>
@@ -1082,7 +1090,7 @@
               <a:rPr lang="en-US" smtClean="0"/>
               <a:t>5/15/2025</a:t>
             </a:fld>
-            <a:endParaRPr lang="en-US"/>
+            <a:endParaRPr lang="en-US" dirty="0"/>
           </a:p>
         </p:txBody>
       </p:sp>
@@ -1101,7 +1109,7 @@
           <a:bodyPr/>
           <a:lstStyle/>
           <a:p>
-            <a:endParaRPr lang="en-US"/>
+            <a:endParaRPr lang="en-US" dirty="0"/>
           </a:p>
         </p:txBody>
       </p:sp>
@@ -1124,7 +1132,7 @@
               <a:rPr lang="en-US" smtClean="0"/>
               <a:t>‹#›</a:t>
             </a:fld>
-            <a:endParaRPr lang="en-US"/>
+            <a:endParaRPr lang="en-US" dirty="0"/>
           </a:p>
         </p:txBody>
       </p:sp>
@@ -1370,7 +1378,7 @@
               <a:rPr lang="en-US" smtClean="0"/>
               <a:t>5/15/2025</a:t>
             </a:fld>
-            <a:endParaRPr lang="en-US"/>
+            <a:endParaRPr lang="en-US" dirty="0"/>
           </a:p>
         </p:txBody>
       </p:sp>
@@ -1389,7 +1397,7 @@
           <a:bodyPr/>
           <a:lstStyle/>
           <a:p>
-            <a:endParaRPr lang="en-US"/>
+            <a:endParaRPr lang="en-US" dirty="0"/>
           </a:p>
         </p:txBody>
       </p:sp>
@@ -1412,7 +1420,7 @@
               <a:rPr lang="en-US" smtClean="0"/>
               <a:t>‹#›</a:t>
             </a:fld>
-            <a:endParaRPr lang="en-US"/>
+            <a:endParaRPr lang="en-US" dirty="0"/>
           </a:p>
         </p:txBody>
       </p:sp>
@@ -1792,7 +1800,7 @@
               <a:rPr lang="en-US" smtClean="0"/>
               <a:t>5/15/2025</a:t>
             </a:fld>
-            <a:endParaRPr lang="en-US"/>
+            <a:endParaRPr lang="en-US" dirty="0"/>
           </a:p>
         </p:txBody>
       </p:sp>
@@ -1811,7 +1819,7 @@
           <a:bodyPr/>
           <a:lstStyle/>
           <a:p>
-            <a:endParaRPr lang="en-US"/>
+            <a:endParaRPr lang="en-US" dirty="0"/>
           </a:p>
         </p:txBody>
       </p:sp>
@@ -1834,7 +1842,7 @@
               <a:rPr lang="en-US" smtClean="0"/>
               <a:t>‹#›</a:t>
             </a:fld>
-            <a:endParaRPr lang="en-US"/>
+            <a:endParaRPr lang="en-US" dirty="0"/>
           </a:p>
         </p:txBody>
       </p:sp>
@@ -1910,7 +1918,7 @@
               <a:rPr lang="en-US" smtClean="0"/>
               <a:t>5/15/2025</a:t>
             </a:fld>
-            <a:endParaRPr lang="en-US"/>
+            <a:endParaRPr lang="en-US" dirty="0"/>
           </a:p>
         </p:txBody>
       </p:sp>
@@ -1929,7 +1937,7 @@
           <a:bodyPr/>
           <a:lstStyle/>
           <a:p>
-            <a:endParaRPr lang="en-US"/>
+            <a:endParaRPr lang="en-US" dirty="0"/>
           </a:p>
         </p:txBody>
       </p:sp>
@@ -1952,7 +1960,7 @@
               <a:rPr lang="en-US" smtClean="0"/>
               <a:t>‹#›</a:t>
             </a:fld>
-            <a:endParaRPr lang="en-US"/>
+            <a:endParaRPr lang="en-US" dirty="0"/>
           </a:p>
         </p:txBody>
       </p:sp>
@@ -2005,7 +2013,7 @@
               <a:rPr lang="en-US" smtClean="0"/>
               <a:t>5/15/2025</a:t>
             </a:fld>
-            <a:endParaRPr lang="en-US"/>
+            <a:endParaRPr lang="en-US" dirty="0"/>
           </a:p>
         </p:txBody>
       </p:sp>
@@ -2024,7 +2032,7 @@
           <a:bodyPr/>
           <a:lstStyle/>
           <a:p>
-            <a:endParaRPr lang="en-US"/>
+            <a:endParaRPr lang="en-US" dirty="0"/>
           </a:p>
         </p:txBody>
       </p:sp>
@@ -2047,7 +2055,7 @@
               <a:rPr lang="en-US" smtClean="0"/>
               <a:t>‹#›</a:t>
             </a:fld>
-            <a:endParaRPr lang="en-US"/>
+            <a:endParaRPr lang="en-US" dirty="0"/>
           </a:p>
         </p:txBody>
       </p:sp>
@@ -2282,7 +2290,7 @@
               <a:rPr lang="en-US" smtClean="0"/>
               <a:t>5/15/2025</a:t>
             </a:fld>
-            <a:endParaRPr lang="en-US"/>
+            <a:endParaRPr lang="en-US" dirty="0"/>
           </a:p>
         </p:txBody>
       </p:sp>
@@ -2301,7 +2309,7 @@
           <a:bodyPr/>
           <a:lstStyle/>
           <a:p>
-            <a:endParaRPr lang="en-US"/>
+            <a:endParaRPr lang="en-US" dirty="0"/>
           </a:p>
         </p:txBody>
       </p:sp>
@@ -2324,7 +2332,7 @@
               <a:rPr lang="en-US" smtClean="0"/>
               <a:t>‹#›</a:t>
             </a:fld>
-            <a:endParaRPr lang="en-US"/>
+            <a:endParaRPr lang="en-US" dirty="0"/>
           </a:p>
         </p:txBody>
       </p:sp>
@@ -2447,7 +2455,7 @@
             </a:lvl9pPr>
           </a:lstStyle>
           <a:p>
-            <a:endParaRPr lang="en-US"/>
+            <a:endParaRPr lang="en-US" dirty="0"/>
           </a:p>
         </p:txBody>
       </p:sp>
@@ -2535,7 +2543,7 @@
               <a:rPr lang="en-US" smtClean="0"/>
               <a:t>5/15/2025</a:t>
             </a:fld>
-            <a:endParaRPr lang="en-US"/>
+            <a:endParaRPr lang="en-US" dirty="0"/>
           </a:p>
         </p:txBody>
       </p:sp>
@@ -2554,7 +2562,7 @@
           <a:bodyPr/>
           <a:lstStyle/>
           <a:p>
-            <a:endParaRPr lang="en-US"/>
+            <a:endParaRPr lang="en-US" dirty="0"/>
           </a:p>
         </p:txBody>
       </p:sp>
@@ -2577,7 +2585,7 @@
               <a:rPr lang="en-US" smtClean="0"/>
               <a:t>‹#›</a:t>
             </a:fld>
-            <a:endParaRPr lang="en-US"/>
+            <a:endParaRPr lang="en-US" dirty="0"/>
           </a:p>
         </p:txBody>
       </p:sp>
@@ -2748,7 +2756,7 @@
               <a:rPr lang="en-US" smtClean="0"/>
               <a:t>5/15/2025</a:t>
             </a:fld>
-            <a:endParaRPr lang="en-US"/>
+            <a:endParaRPr lang="en-US" dirty="0"/>
           </a:p>
         </p:txBody>
       </p:sp>
@@ -2785,7 +2793,7 @@
             </a:lvl1pPr>
           </a:lstStyle>
           <a:p>
-            <a:endParaRPr lang="en-US"/>
+            <a:endParaRPr lang="en-US" dirty="0"/>
           </a:p>
         </p:txBody>
       </p:sp>
@@ -2826,7 +2834,7 @@
               <a:rPr lang="en-US" smtClean="0"/>
               <a:t>‹#›</a:t>
             </a:fld>
-            <a:endParaRPr lang="en-US"/>
+            <a:endParaRPr lang="en-US" dirty="0"/>
           </a:p>
         </p:txBody>
       </p:sp>
@@ -3144,36 +3152,12 @@
           <a:lstStyle/>
           <a:p>
             <a:r>
-              <a:rPr lang="en-US" dirty="0" err="1" smtClean="0">
+              <a:rPr lang="en-US" dirty="0" smtClean="0">
                 <a:solidFill>
                   <a:schemeClr val="tx2"/>
                 </a:solidFill>
               </a:rPr>
-              <a:t>Wache</a:t>
-            </a:r>
-            <a:r>
-              <a:rPr lang="en-US" dirty="0" smtClean="0">
-                <a:solidFill>
-                  <a:schemeClr val="tx2"/>
-                </a:solidFill>
-              </a:rPr>
-              <a:t>-Market: An Online Marketplace for </a:t>
-            </a:r>
-            <a:r>
-              <a:rPr lang="en-US" dirty="0" err="1" smtClean="0">
-                <a:solidFill>
-                  <a:schemeClr val="tx2"/>
-                </a:solidFill>
-              </a:rPr>
-              <a:t>Wachemo</a:t>
-            </a:r>
-            <a:r>
-              <a:rPr lang="en-US" dirty="0" smtClean="0">
-                <a:solidFill>
-                  <a:schemeClr val="tx2"/>
-                </a:solidFill>
-              </a:rPr>
-              <a:t> University</a:t>
+              <a:t>Wache-Market: An Online Marketplace for Wachemo University</a:t>
             </a:r>
             <a:r>
               <a:rPr lang="en-US" dirty="0" smtClean="0"/>
@@ -3227,15 +3211,17 @@
                   <a:schemeClr val="accent1"/>
                 </a:solidFill>
               </a:rPr>
-              <a:t>Samuel </a:t>
-            </a:r>
-            <a:r>
-              <a:rPr lang="en-US" sz="2400" dirty="0" err="1" smtClean="0">
-                <a:solidFill>
-                  <a:schemeClr val="accent1"/>
-                </a:solidFill>
-              </a:rPr>
-              <a:t>Tefera</a:t>
+              <a:t>Samuel Tefera, Kedija Ansha, Angelina Melese, Gideon Daniel, Mohammed Belayneh</a:t>
+            </a:r>
+          </a:p>
+          <a:p>
+            <a:r>
+              <a:rPr lang="en-US" sz="2400" b="1" dirty="0" smtClean="0">
+                <a:solidFill>
+                  <a:schemeClr val="accent1"/>
+                </a:solidFill>
+              </a:rPr>
+              <a:t>Institution</a:t>
             </a:r>
             <a:r>
               <a:rPr lang="en-US" sz="2400" dirty="0" smtClean="0">
@@ -3243,102 +3229,7 @@
                   <a:schemeClr val="accent1"/>
                 </a:solidFill>
               </a:rPr>
-              <a:t>, </a:t>
-            </a:r>
-            <a:r>
-              <a:rPr lang="en-US" sz="2400" dirty="0" err="1" smtClean="0">
-                <a:solidFill>
-                  <a:schemeClr val="accent1"/>
-                </a:solidFill>
-              </a:rPr>
-              <a:t>Kedija</a:t>
-            </a:r>
-            <a:r>
-              <a:rPr lang="en-US" sz="2400" dirty="0" smtClean="0">
-                <a:solidFill>
-                  <a:schemeClr val="accent1"/>
-                </a:solidFill>
-              </a:rPr>
-              <a:t> </a:t>
-            </a:r>
-            <a:r>
-              <a:rPr lang="en-US" sz="2400" dirty="0" err="1" smtClean="0">
-                <a:solidFill>
-                  <a:schemeClr val="accent1"/>
-                </a:solidFill>
-              </a:rPr>
-              <a:t>Ansha</a:t>
-            </a:r>
-            <a:r>
-              <a:rPr lang="en-US" sz="2400" dirty="0" smtClean="0">
-                <a:solidFill>
-                  <a:schemeClr val="accent1"/>
-                </a:solidFill>
-              </a:rPr>
-              <a:t>, Angelina </a:t>
-            </a:r>
-            <a:r>
-              <a:rPr lang="en-US" sz="2400" dirty="0" err="1" smtClean="0">
-                <a:solidFill>
-                  <a:schemeClr val="accent1"/>
-                </a:solidFill>
-              </a:rPr>
-              <a:t>Melese</a:t>
-            </a:r>
-            <a:r>
-              <a:rPr lang="en-US" sz="2400" dirty="0" smtClean="0">
-                <a:solidFill>
-                  <a:schemeClr val="accent1"/>
-                </a:solidFill>
-              </a:rPr>
-              <a:t>, Gideon Daniel, Mohammed </a:t>
-            </a:r>
-            <a:r>
-              <a:rPr lang="en-US" sz="2400" dirty="0" err="1" smtClean="0">
-                <a:solidFill>
-                  <a:schemeClr val="accent1"/>
-                </a:solidFill>
-              </a:rPr>
-              <a:t>Belayneh</a:t>
-            </a:r>
-            <a:endParaRPr lang="en-US" sz="2400" dirty="0" smtClean="0">
-              <a:solidFill>
-                <a:schemeClr val="accent1"/>
-              </a:solidFill>
-            </a:endParaRPr>
-          </a:p>
-          <a:p>
-            <a:r>
-              <a:rPr lang="en-US" sz="2400" b="1" dirty="0" smtClean="0">
-                <a:solidFill>
-                  <a:schemeClr val="accent1"/>
-                </a:solidFill>
-              </a:rPr>
-              <a:t>Institution</a:t>
-            </a:r>
-            <a:r>
-              <a:rPr lang="en-US" sz="2400" dirty="0" smtClean="0">
-                <a:solidFill>
-                  <a:schemeClr val="accent1"/>
-                </a:solidFill>
-              </a:rPr>
-              <a:t>: </a:t>
-            </a:r>
-            <a:r>
-              <a:rPr lang="en-US" sz="2400" dirty="0" err="1" smtClean="0">
-                <a:solidFill>
-                  <a:schemeClr val="accent1"/>
-                </a:solidFill>
-              </a:rPr>
-              <a:t>Wachemo</a:t>
-            </a:r>
-            <a:r>
-              <a:rPr lang="en-US" sz="2400" dirty="0" smtClean="0">
-                <a:solidFill>
-                  <a:schemeClr val="accent1"/>
-                </a:solidFill>
-              </a:rPr>
-              <a:t> University, College of Engineering and Technology, Department of Software Engineering</a:t>
+              <a:t>: Wachemo University, College of Engineering and Technology, Department of Software Engineering</a:t>
             </a:r>
           </a:p>
           <a:p>
@@ -3378,6 +3269,558 @@
 </file>
 
 <file path=ppt/slides/slide10.xml><?xml version="1.0" encoding="utf-8"?>
+<p:sld xmlns:a="http://schemas.openxmlformats.org/drawingml/2006/main" xmlns:r="http://schemas.openxmlformats.org/officeDocument/2006/relationships" xmlns:p="http://schemas.openxmlformats.org/presentationml/2006/main">
+  <p:cSld>
+    <p:spTree>
+      <p:nvGrpSpPr>
+        <p:cNvPr id="1" name=""/>
+        <p:cNvGrpSpPr/>
+        <p:nvPr/>
+      </p:nvGrpSpPr>
+      <p:grpSpPr>
+        <a:xfrm>
+          <a:off x="0" y="0"/>
+          <a:ext cx="0" cy="0"/>
+          <a:chOff x="0" y="0"/>
+          <a:chExt cx="0" cy="0"/>
+        </a:xfrm>
+      </p:grpSpPr>
+      <p:sp>
+        <p:nvSpPr>
+          <p:cNvPr id="2" name="Title 1"/>
+          <p:cNvSpPr>
+            <a:spLocks noGrp="1"/>
+          </p:cNvSpPr>
+          <p:nvPr>
+            <p:ph type="title"/>
+          </p:nvPr>
+        </p:nvSpPr>
+        <p:spPr/>
+        <p:txBody>
+          <a:bodyPr>
+            <a:normAutofit fontScale="90000"/>
+          </a:bodyPr>
+          <a:lstStyle/>
+          <a:p>
+            <a:r>
+              <a:rPr lang="en-US" b="1" dirty="0" smtClean="0">
+                <a:solidFill>
+                  <a:schemeClr val="accent1"/>
+                </a:solidFill>
+              </a:rPr>
+              <a:t>Use Case Modeling</a:t>
+            </a:r>
+            <a:r>
+              <a:rPr lang="en-US" b="1" dirty="0" smtClean="0"/>
+              <a:t/>
+            </a:r>
+            <a:br>
+              <a:rPr lang="en-US" b="1" dirty="0" smtClean="0"/>
+            </a:br>
+            <a:r>
+              <a:rPr lang="en-US" dirty="0" smtClean="0"/>
+              <a:t> </a:t>
+            </a:r>
+            <a:endParaRPr lang="en-US" dirty="0"/>
+          </a:p>
+        </p:txBody>
+      </p:sp>
+      <p:pic>
+        <p:nvPicPr>
+          <p:cNvPr id="4" name="Content Placeholder 3"/>
+          <p:cNvPicPr>
+            <a:picLocks noGrp="1" noChangeAspect="1"/>
+          </p:cNvPicPr>
+          <p:nvPr>
+            <p:ph idx="1"/>
+          </p:nvPr>
+        </p:nvPicPr>
+        <p:blipFill>
+          <a:blip r:embed="rId2" cstate="print">
+            <a:extLst>
+              <a:ext uri="{28A0092B-C50C-407E-A947-70E740481C1C}">
+                <a14:useLocalDpi xmlns:a14="http://schemas.microsoft.com/office/drawing/2010/main" val="0"/>
+              </a:ext>
+            </a:extLst>
+          </a:blip>
+          <a:stretch>
+            <a:fillRect/>
+          </a:stretch>
+        </p:blipFill>
+        <p:spPr>
+          <a:xfrm>
+            <a:off x="1474065" y="1050346"/>
+            <a:ext cx="6222135" cy="5075818"/>
+          </a:xfrm>
+        </p:spPr>
+      </p:pic>
+    </p:spTree>
+    <p:extLst>
+      <p:ext uri="{BB962C8B-B14F-4D97-AF65-F5344CB8AC3E}">
+        <p14:creationId xmlns:p14="http://schemas.microsoft.com/office/powerpoint/2010/main" val="1610863524"/>
+      </p:ext>
+    </p:extLst>
+  </p:cSld>
+  <p:clrMapOvr>
+    <a:masterClrMapping/>
+  </p:clrMapOvr>
+</p:sld>
+</file>
+
+<file path=ppt/slides/slide11.xml><?xml version="1.0" encoding="utf-8"?>
+<p:sld xmlns:a="http://schemas.openxmlformats.org/drawingml/2006/main" xmlns:r="http://schemas.openxmlformats.org/officeDocument/2006/relationships" xmlns:p="http://schemas.openxmlformats.org/presentationml/2006/main">
+  <p:cSld>
+    <p:spTree>
+      <p:nvGrpSpPr>
+        <p:cNvPr id="1" name=""/>
+        <p:cNvGrpSpPr/>
+        <p:nvPr/>
+      </p:nvGrpSpPr>
+      <p:grpSpPr>
+        <a:xfrm>
+          <a:off x="0" y="0"/>
+          <a:ext cx="0" cy="0"/>
+          <a:chOff x="0" y="0"/>
+          <a:chExt cx="0" cy="0"/>
+        </a:xfrm>
+      </p:grpSpPr>
+      <p:sp>
+        <p:nvSpPr>
+          <p:cNvPr id="2" name="Title 1"/>
+          <p:cNvSpPr>
+            <a:spLocks noGrp="1"/>
+          </p:cNvSpPr>
+          <p:nvPr>
+            <p:ph type="title"/>
+          </p:nvPr>
+        </p:nvSpPr>
+        <p:spPr/>
+        <p:txBody>
+          <a:bodyPr/>
+          <a:lstStyle/>
+          <a:p>
+            <a:r>
+              <a:rPr lang="en-US" b="1" dirty="0">
+                <a:solidFill>
+                  <a:schemeClr val="accent1"/>
+                </a:solidFill>
+              </a:rPr>
+              <a:t>Sequence Diagrams</a:t>
+            </a:r>
+            <a:endParaRPr lang="en-US" dirty="0"/>
+          </a:p>
+        </p:txBody>
+      </p:sp>
+      <p:sp>
+        <p:nvSpPr>
+          <p:cNvPr id="3" name="Content Placeholder 2"/>
+          <p:cNvSpPr>
+            <a:spLocks noGrp="1"/>
+          </p:cNvSpPr>
+          <p:nvPr>
+            <p:ph idx="1"/>
+          </p:nvPr>
+        </p:nvSpPr>
+        <p:spPr/>
+        <p:txBody>
+          <a:bodyPr/>
+          <a:lstStyle/>
+          <a:p>
+            <a:r>
+              <a:rPr lang="en-US" dirty="0">
+                <a:solidFill>
+                  <a:schemeClr val="tx2"/>
+                </a:solidFill>
+              </a:rPr>
+              <a:t>A </a:t>
+            </a:r>
+            <a:r>
+              <a:rPr lang="en-US" b="1" dirty="0">
+                <a:solidFill>
+                  <a:schemeClr val="tx2"/>
+                </a:solidFill>
+              </a:rPr>
+              <a:t>UML diagram</a:t>
+            </a:r>
+            <a:r>
+              <a:rPr lang="en-US" dirty="0">
+                <a:solidFill>
+                  <a:schemeClr val="tx2"/>
+                </a:solidFill>
+              </a:rPr>
+              <a:t> showing </a:t>
+            </a:r>
+            <a:r>
+              <a:rPr lang="en-US" b="1" dirty="0">
+                <a:solidFill>
+                  <a:schemeClr val="tx2"/>
+                </a:solidFill>
+              </a:rPr>
+              <a:t>step-by-step interactions</a:t>
+            </a:r>
+            <a:r>
+              <a:rPr lang="en-US" dirty="0">
+                <a:solidFill>
+                  <a:schemeClr val="tx2"/>
+                </a:solidFill>
+              </a:rPr>
+              <a:t> between objects/components over time.</a:t>
+            </a:r>
+          </a:p>
+        </p:txBody>
+      </p:sp>
+    </p:spTree>
+    <p:extLst>
+      <p:ext uri="{BB962C8B-B14F-4D97-AF65-F5344CB8AC3E}">
+        <p14:creationId xmlns:p14="http://schemas.microsoft.com/office/powerpoint/2010/main" val="3148568107"/>
+      </p:ext>
+    </p:extLst>
+  </p:cSld>
+  <p:clrMapOvr>
+    <a:masterClrMapping/>
+  </p:clrMapOvr>
+</p:sld>
+</file>
+
+<file path=ppt/slides/slide12.xml><?xml version="1.0" encoding="utf-8"?>
+<p:sld xmlns:a="http://schemas.openxmlformats.org/drawingml/2006/main" xmlns:r="http://schemas.openxmlformats.org/officeDocument/2006/relationships" xmlns:p="http://schemas.openxmlformats.org/presentationml/2006/main">
+  <p:cSld>
+    <p:spTree>
+      <p:nvGrpSpPr>
+        <p:cNvPr id="1" name=""/>
+        <p:cNvGrpSpPr/>
+        <p:nvPr/>
+      </p:nvGrpSpPr>
+      <p:grpSpPr>
+        <a:xfrm>
+          <a:off x="0" y="0"/>
+          <a:ext cx="0" cy="0"/>
+          <a:chOff x="0" y="0"/>
+          <a:chExt cx="0" cy="0"/>
+        </a:xfrm>
+      </p:grpSpPr>
+      <p:sp>
+        <p:nvSpPr>
+          <p:cNvPr id="2" name="Title 1"/>
+          <p:cNvSpPr>
+            <a:spLocks noGrp="1"/>
+          </p:cNvSpPr>
+          <p:nvPr>
+            <p:ph type="title"/>
+          </p:nvPr>
+        </p:nvSpPr>
+        <p:spPr/>
+        <p:txBody>
+          <a:bodyPr>
+            <a:normAutofit fontScale="90000"/>
+          </a:bodyPr>
+          <a:lstStyle/>
+          <a:p>
+            <a:r>
+              <a:rPr lang="en-US" b="1" dirty="0">
+                <a:solidFill>
+                  <a:schemeClr val="tx2"/>
+                </a:solidFill>
+              </a:rPr>
+              <a:t>Key Elements</a:t>
+            </a:r>
+            <a:r>
+              <a:rPr lang="en-US" b="1" dirty="0"/>
+              <a:t/>
+            </a:r>
+            <a:br>
+              <a:rPr lang="en-US" b="1" dirty="0"/>
+            </a:br>
+            <a:endParaRPr lang="en-US" dirty="0"/>
+          </a:p>
+        </p:txBody>
+      </p:sp>
+      <p:sp>
+        <p:nvSpPr>
+          <p:cNvPr id="3" name="Content Placeholder 2"/>
+          <p:cNvSpPr>
+            <a:spLocks noGrp="1"/>
+          </p:cNvSpPr>
+          <p:nvPr>
+            <p:ph idx="1"/>
+          </p:nvPr>
+        </p:nvSpPr>
+        <p:spPr/>
+        <p:txBody>
+          <a:bodyPr/>
+          <a:lstStyle/>
+          <a:p>
+            <a:r>
+              <a:rPr lang="en-US" b="1" dirty="0">
+                <a:solidFill>
+                  <a:schemeClr val="tx2"/>
+                </a:solidFill>
+              </a:rPr>
+              <a:t>Actors/Objects</a:t>
+            </a:r>
+            <a:r>
+              <a:rPr lang="en-US" dirty="0">
+                <a:solidFill>
+                  <a:schemeClr val="tx2"/>
+                </a:solidFill>
+              </a:rPr>
+              <a:t> – Participants in the interaction.</a:t>
+            </a:r>
+          </a:p>
+          <a:p>
+            <a:r>
+              <a:rPr lang="en-US" b="1" dirty="0">
+                <a:solidFill>
+                  <a:schemeClr val="tx2"/>
+                </a:solidFill>
+              </a:rPr>
+              <a:t>Lifelines</a:t>
+            </a:r>
+            <a:r>
+              <a:rPr lang="en-US" dirty="0">
+                <a:solidFill>
+                  <a:schemeClr val="tx2"/>
+                </a:solidFill>
+              </a:rPr>
+              <a:t> – Vertical dashed lines showing object lifespan.</a:t>
+            </a:r>
+          </a:p>
+          <a:p>
+            <a:r>
+              <a:rPr lang="en-US" b="1" dirty="0">
+                <a:solidFill>
+                  <a:schemeClr val="tx2"/>
+                </a:solidFill>
+              </a:rPr>
+              <a:t>Messages</a:t>
+            </a:r>
+            <a:r>
+              <a:rPr lang="en-US" dirty="0">
+                <a:solidFill>
+                  <a:schemeClr val="tx2"/>
+                </a:solidFill>
+              </a:rPr>
+              <a:t> – Arrows indicating communication (e.g., requests, responses).</a:t>
+            </a:r>
+          </a:p>
+          <a:p>
+            <a:r>
+              <a:rPr lang="en-US" b="1" dirty="0">
+                <a:solidFill>
+                  <a:schemeClr val="tx2"/>
+                </a:solidFill>
+              </a:rPr>
+              <a:t>Activation Bars</a:t>
+            </a:r>
+            <a:r>
+              <a:rPr lang="en-US" dirty="0">
+                <a:solidFill>
+                  <a:schemeClr val="tx2"/>
+                </a:solidFill>
+              </a:rPr>
+              <a:t> – Time periods when an object is active.</a:t>
+            </a:r>
+          </a:p>
+          <a:p>
+            <a:pPr marL="514350" indent="-514350">
+              <a:buFont typeface="+mj-lt"/>
+              <a:buAutoNum type="arabicPeriod"/>
+            </a:pPr>
+            <a:endParaRPr lang="en-US" dirty="0"/>
+          </a:p>
+        </p:txBody>
+      </p:sp>
+    </p:spTree>
+    <p:extLst>
+      <p:ext uri="{BB962C8B-B14F-4D97-AF65-F5344CB8AC3E}">
+        <p14:creationId xmlns:p14="http://schemas.microsoft.com/office/powerpoint/2010/main" val="791206933"/>
+      </p:ext>
+    </p:extLst>
+  </p:cSld>
+  <p:clrMapOvr>
+    <a:masterClrMapping/>
+  </p:clrMapOvr>
+</p:sld>
+</file>
+
+<file path=ppt/slides/slide13.xml><?xml version="1.0" encoding="utf-8"?>
+<p:sld xmlns:a="http://schemas.openxmlformats.org/drawingml/2006/main" xmlns:r="http://schemas.openxmlformats.org/officeDocument/2006/relationships" xmlns:p="http://schemas.openxmlformats.org/presentationml/2006/main">
+  <p:cSld>
+    <p:spTree>
+      <p:nvGrpSpPr>
+        <p:cNvPr id="1" name=""/>
+        <p:cNvGrpSpPr/>
+        <p:nvPr/>
+      </p:nvGrpSpPr>
+      <p:grpSpPr>
+        <a:xfrm>
+          <a:off x="0" y="0"/>
+          <a:ext cx="0" cy="0"/>
+          <a:chOff x="0" y="0"/>
+          <a:chExt cx="0" cy="0"/>
+        </a:xfrm>
+      </p:grpSpPr>
+      <p:sp>
+        <p:nvSpPr>
+          <p:cNvPr id="2" name="Title 1"/>
+          <p:cNvSpPr>
+            <a:spLocks noGrp="1"/>
+          </p:cNvSpPr>
+          <p:nvPr>
+            <p:ph type="title"/>
+          </p:nvPr>
+        </p:nvSpPr>
+        <p:spPr/>
+        <p:txBody>
+          <a:bodyPr>
+            <a:normAutofit fontScale="90000"/>
+          </a:bodyPr>
+          <a:lstStyle/>
+          <a:p>
+            <a:r>
+              <a:rPr lang="en-US" b="1" dirty="0" smtClean="0">
+                <a:solidFill>
+                  <a:schemeClr val="accent1"/>
+                </a:solidFill>
+              </a:rPr>
+              <a:t>Sequence Diagrams</a:t>
+            </a:r>
+            <a:r>
+              <a:rPr lang="en-US" b="1" dirty="0" smtClean="0"/>
+              <a:t/>
+            </a:r>
+            <a:br>
+              <a:rPr lang="en-US" b="1" dirty="0" smtClean="0"/>
+            </a:br>
+            <a:endParaRPr lang="en-US" dirty="0"/>
+          </a:p>
+        </p:txBody>
+      </p:sp>
+      <p:pic>
+        <p:nvPicPr>
+          <p:cNvPr id="4" name="Content Placeholder 3"/>
+          <p:cNvPicPr>
+            <a:picLocks noGrp="1" noChangeAspect="1"/>
+          </p:cNvPicPr>
+          <p:nvPr>
+            <p:ph idx="1"/>
+          </p:nvPr>
+        </p:nvPicPr>
+        <p:blipFill>
+          <a:blip r:embed="rId2">
+            <a:extLst>
+              <a:ext uri="{28A0092B-C50C-407E-A947-70E740481C1C}">
+                <a14:useLocalDpi xmlns:a14="http://schemas.microsoft.com/office/drawing/2010/main" val="0"/>
+              </a:ext>
+            </a:extLst>
+          </a:blip>
+          <a:stretch>
+            <a:fillRect/>
+          </a:stretch>
+        </p:blipFill>
+        <p:spPr>
+          <a:xfrm>
+            <a:off x="1423504" y="1600200"/>
+            <a:ext cx="6296992" cy="4525963"/>
+          </a:xfrm>
+        </p:spPr>
+      </p:pic>
+    </p:spTree>
+    <p:extLst>
+      <p:ext uri="{BB962C8B-B14F-4D97-AF65-F5344CB8AC3E}">
+        <p14:creationId xmlns:p14="http://schemas.microsoft.com/office/powerpoint/2010/main" val="666776904"/>
+      </p:ext>
+    </p:extLst>
+  </p:cSld>
+  <p:clrMapOvr>
+    <a:masterClrMapping/>
+  </p:clrMapOvr>
+</p:sld>
+</file>
+
+<file path=ppt/slides/slide14.xml><?xml version="1.0" encoding="utf-8"?>
+<p:sld xmlns:a="http://schemas.openxmlformats.org/drawingml/2006/main" xmlns:r="http://schemas.openxmlformats.org/officeDocument/2006/relationships" xmlns:p="http://schemas.openxmlformats.org/presentationml/2006/main">
+  <p:cSld>
+    <p:spTree>
+      <p:nvGrpSpPr>
+        <p:cNvPr id="1" name=""/>
+        <p:cNvGrpSpPr/>
+        <p:nvPr/>
+      </p:nvGrpSpPr>
+      <p:grpSpPr>
+        <a:xfrm>
+          <a:off x="0" y="0"/>
+          <a:ext cx="0" cy="0"/>
+          <a:chOff x="0" y="0"/>
+          <a:chExt cx="0" cy="0"/>
+        </a:xfrm>
+      </p:grpSpPr>
+      <p:sp>
+        <p:nvSpPr>
+          <p:cNvPr id="2" name="Title 1"/>
+          <p:cNvSpPr>
+            <a:spLocks noGrp="1"/>
+          </p:cNvSpPr>
+          <p:nvPr>
+            <p:ph type="title"/>
+          </p:nvPr>
+        </p:nvSpPr>
+        <p:spPr/>
+        <p:txBody>
+          <a:bodyPr/>
+          <a:lstStyle/>
+          <a:p>
+            <a:r>
+              <a:rPr lang="en-US" dirty="0" smtClean="0"/>
+              <a:t> </a:t>
+            </a:r>
+            <a:endParaRPr lang="en-US" dirty="0"/>
+          </a:p>
+        </p:txBody>
+      </p:sp>
+      <p:pic>
+        <p:nvPicPr>
+          <p:cNvPr id="4" name="Content Placeholder 3"/>
+          <p:cNvPicPr>
+            <a:picLocks noGrp="1" noChangeAspect="1"/>
+          </p:cNvPicPr>
+          <p:nvPr>
+            <p:ph idx="1"/>
+          </p:nvPr>
+        </p:nvPicPr>
+        <p:blipFill>
+          <a:blip r:embed="rId2">
+            <a:extLst>
+              <a:ext uri="{28A0092B-C50C-407E-A947-70E740481C1C}">
+                <a14:useLocalDpi xmlns:a14="http://schemas.microsoft.com/office/drawing/2010/main" val="0"/>
+              </a:ext>
+            </a:extLst>
+          </a:blip>
+          <a:stretch>
+            <a:fillRect/>
+          </a:stretch>
+        </p:blipFill>
+        <p:spPr>
+          <a:xfrm>
+            <a:off x="457200" y="2046883"/>
+            <a:ext cx="8229600" cy="3632596"/>
+          </a:xfrm>
+        </p:spPr>
+      </p:pic>
+    </p:spTree>
+    <p:extLst>
+      <p:ext uri="{BB962C8B-B14F-4D97-AF65-F5344CB8AC3E}">
+        <p14:creationId xmlns:p14="http://schemas.microsoft.com/office/powerpoint/2010/main" val="868895155"/>
+      </p:ext>
+    </p:extLst>
+  </p:cSld>
+  <p:clrMapOvr>
+    <a:masterClrMapping/>
+  </p:clrMapOvr>
+</p:sld>
+</file>
+
+<file path=ppt/slides/slide15.xml><?xml version="1.0" encoding="utf-8"?>
 <p:sld xmlns:a="http://schemas.openxmlformats.org/drawingml/2006/main" xmlns:r="http://schemas.openxmlformats.org/officeDocument/2006/relationships" xmlns:p="http://schemas.openxmlformats.org/presentationml/2006/main">
   <p:cSld>
     <p:spTree>
@@ -3459,7 +3902,7 @@
 </p:sld>
 </file>
 
-<file path=ppt/slides/slide11.xml><?xml version="1.0" encoding="utf-8"?>
+<file path=ppt/slides/slide16.xml><?xml version="1.0" encoding="utf-8"?>
 <p:sld xmlns:a="http://schemas.openxmlformats.org/drawingml/2006/main" xmlns:r="http://schemas.openxmlformats.org/officeDocument/2006/relationships" xmlns:p="http://schemas.openxmlformats.org/presentationml/2006/main">
   <p:cSld>
     <p:spTree>
@@ -3541,7 +3984,7 @@
 </p:sld>
 </file>
 
-<file path=ppt/slides/slide12.xml><?xml version="1.0" encoding="utf-8"?>
+<file path=ppt/slides/slide17.xml><?xml version="1.0" encoding="utf-8"?>
 <p:sld xmlns:a="http://schemas.openxmlformats.org/drawingml/2006/main" xmlns:r="http://schemas.openxmlformats.org/officeDocument/2006/relationships" xmlns:p="http://schemas.openxmlformats.org/presentationml/2006/main">
   <p:cSld>
     <p:spTree>
@@ -3623,7 +4066,7 @@
 </p:sld>
 </file>
 
-<file path=ppt/slides/slide13.xml><?xml version="1.0" encoding="utf-8"?>
+<file path=ppt/slides/slide18.xml><?xml version="1.0" encoding="utf-8"?>
 <p:sld xmlns:a="http://schemas.openxmlformats.org/drawingml/2006/main" xmlns:r="http://schemas.openxmlformats.org/officeDocument/2006/relationships" xmlns:p="http://schemas.openxmlformats.org/presentationml/2006/main">
   <p:cSld>
     <p:spTree>
@@ -3705,7 +4148,658 @@
 </p:sld>
 </file>
 
-<file path=ppt/slides/slide14.xml><?xml version="1.0" encoding="utf-8"?>
+<file path=ppt/slides/slide19.xml><?xml version="1.0" encoding="utf-8"?>
+<p:sld xmlns:a="http://schemas.openxmlformats.org/drawingml/2006/main" xmlns:r="http://schemas.openxmlformats.org/officeDocument/2006/relationships" xmlns:p="http://schemas.openxmlformats.org/presentationml/2006/main">
+  <p:cSld>
+    <p:spTree>
+      <p:nvGrpSpPr>
+        <p:cNvPr id="1" name=""/>
+        <p:cNvGrpSpPr/>
+        <p:nvPr/>
+      </p:nvGrpSpPr>
+      <p:grpSpPr>
+        <a:xfrm>
+          <a:off x="0" y="0"/>
+          <a:ext cx="0" cy="0"/>
+          <a:chOff x="0" y="0"/>
+          <a:chExt cx="0" cy="0"/>
+        </a:xfrm>
+      </p:grpSpPr>
+      <p:sp>
+        <p:nvSpPr>
+          <p:cNvPr id="2" name="Title 1"/>
+          <p:cNvSpPr>
+            <a:spLocks noGrp="1"/>
+          </p:cNvSpPr>
+          <p:nvPr>
+            <p:ph type="title"/>
+          </p:nvPr>
+        </p:nvSpPr>
+        <p:spPr/>
+        <p:txBody>
+          <a:bodyPr/>
+          <a:lstStyle/>
+          <a:p>
+            <a:r>
+              <a:rPr lang="en-US" b="1" dirty="0">
+                <a:solidFill>
+                  <a:schemeClr val="accent1"/>
+                </a:solidFill>
+              </a:rPr>
+              <a:t>Class </a:t>
+            </a:r>
+            <a:r>
+              <a:rPr lang="en-US" b="1" dirty="0" err="1" smtClean="0">
+                <a:solidFill>
+                  <a:schemeClr val="accent1"/>
+                </a:solidFill>
+              </a:rPr>
+              <a:t>Digram</a:t>
+            </a:r>
+            <a:endParaRPr lang="en-US" dirty="0"/>
+          </a:p>
+        </p:txBody>
+      </p:sp>
+      <p:sp>
+        <p:nvSpPr>
+          <p:cNvPr id="3" name="Content Placeholder 2"/>
+          <p:cNvSpPr>
+            <a:spLocks noGrp="1"/>
+          </p:cNvSpPr>
+          <p:nvPr>
+            <p:ph idx="1"/>
+          </p:nvPr>
+        </p:nvSpPr>
+        <p:spPr/>
+        <p:txBody>
+          <a:bodyPr/>
+          <a:lstStyle/>
+          <a:p>
+            <a:r>
+              <a:rPr lang="en-US" dirty="0">
+                <a:solidFill>
+                  <a:schemeClr val="tx2"/>
+                </a:solidFill>
+              </a:rPr>
+              <a:t>A </a:t>
+            </a:r>
+            <a:r>
+              <a:rPr lang="en-US" b="1" dirty="0">
+                <a:solidFill>
+                  <a:schemeClr val="tx2"/>
+                </a:solidFill>
+              </a:rPr>
+              <a:t>UML structural diagram</a:t>
+            </a:r>
+            <a:r>
+              <a:rPr lang="en-US" dirty="0">
+                <a:solidFill>
+                  <a:schemeClr val="tx2"/>
+                </a:solidFill>
+              </a:rPr>
+              <a:t> that shows </a:t>
+            </a:r>
+            <a:r>
+              <a:rPr lang="en-US" b="1" dirty="0">
+                <a:solidFill>
+                  <a:schemeClr val="tx2"/>
+                </a:solidFill>
+              </a:rPr>
+              <a:t>classes, attributes, methods, and relationships</a:t>
+            </a:r>
+            <a:r>
+              <a:rPr lang="en-US" dirty="0">
+                <a:solidFill>
+                  <a:schemeClr val="tx2"/>
+                </a:solidFill>
+              </a:rPr>
+              <a:t> in a system.</a:t>
+            </a:r>
+          </a:p>
+          <a:p>
+            <a:r>
+              <a:rPr lang="en-US" dirty="0">
+                <a:solidFill>
+                  <a:schemeClr val="tx2"/>
+                </a:solidFill>
+              </a:rPr>
+              <a:t>Represents the </a:t>
+            </a:r>
+            <a:r>
+              <a:rPr lang="en-US" b="1" dirty="0">
+                <a:solidFill>
+                  <a:schemeClr val="tx2"/>
+                </a:solidFill>
+              </a:rPr>
+              <a:t>static structure</a:t>
+            </a:r>
+            <a:r>
+              <a:rPr lang="en-US" dirty="0">
+                <a:solidFill>
+                  <a:schemeClr val="tx2"/>
+                </a:solidFill>
+              </a:rPr>
+              <a:t> of an application.</a:t>
+            </a:r>
+          </a:p>
+          <a:p>
+            <a:endParaRPr lang="en-US" dirty="0"/>
+          </a:p>
+        </p:txBody>
+      </p:sp>
+    </p:spTree>
+    <p:extLst>
+      <p:ext uri="{BB962C8B-B14F-4D97-AF65-F5344CB8AC3E}">
+        <p14:creationId xmlns:p14="http://schemas.microsoft.com/office/powerpoint/2010/main" val="3188653841"/>
+      </p:ext>
+    </p:extLst>
+  </p:cSld>
+  <p:clrMapOvr>
+    <a:masterClrMapping/>
+  </p:clrMapOvr>
+</p:sld>
+</file>
+
+<file path=ppt/slides/slide2.xml><?xml version="1.0" encoding="utf-8"?>
+<p:sld xmlns:a="http://schemas.openxmlformats.org/drawingml/2006/main" xmlns:r="http://schemas.openxmlformats.org/officeDocument/2006/relationships" xmlns:p="http://schemas.openxmlformats.org/presentationml/2006/main">
+  <p:cSld>
+    <p:spTree>
+      <p:nvGrpSpPr>
+        <p:cNvPr id="1" name=""/>
+        <p:cNvGrpSpPr/>
+        <p:nvPr/>
+      </p:nvGrpSpPr>
+      <p:grpSpPr>
+        <a:xfrm>
+          <a:off x="0" y="0"/>
+          <a:ext cx="0" cy="0"/>
+          <a:chOff x="0" y="0"/>
+          <a:chExt cx="0" cy="0"/>
+        </a:xfrm>
+      </p:grpSpPr>
+      <p:sp>
+        <p:nvSpPr>
+          <p:cNvPr id="2" name="Title 1"/>
+          <p:cNvSpPr>
+            <a:spLocks noGrp="1"/>
+          </p:cNvSpPr>
+          <p:nvPr>
+            <p:ph type="title"/>
+          </p:nvPr>
+        </p:nvSpPr>
+        <p:spPr/>
+        <p:txBody>
+          <a:bodyPr>
+            <a:normAutofit fontScale="90000"/>
+          </a:bodyPr>
+          <a:lstStyle/>
+          <a:p>
+            <a:r>
+              <a:rPr lang="en-US" b="1" dirty="0" smtClean="0">
+                <a:solidFill>
+                  <a:schemeClr val="accent1"/>
+                </a:solidFill>
+              </a:rPr>
+              <a:t>Presentation Outline</a:t>
+            </a:r>
+            <a:r>
+              <a:rPr lang="en-US" dirty="0" smtClean="0"/>
+              <a:t/>
+            </a:r>
+            <a:br>
+              <a:rPr lang="en-US" dirty="0" smtClean="0"/>
+            </a:br>
+            <a:endParaRPr lang="en-US" dirty="0"/>
+          </a:p>
+        </p:txBody>
+      </p:sp>
+      <p:sp>
+        <p:nvSpPr>
+          <p:cNvPr id="3" name="Content Placeholder 2"/>
+          <p:cNvSpPr>
+            <a:spLocks noGrp="1"/>
+          </p:cNvSpPr>
+          <p:nvPr>
+            <p:ph idx="1"/>
+          </p:nvPr>
+        </p:nvSpPr>
+        <p:spPr/>
+        <p:txBody>
+          <a:bodyPr>
+            <a:normAutofit fontScale="70000" lnSpcReduction="20000"/>
+          </a:bodyPr>
+          <a:lstStyle/>
+          <a:p>
+            <a:r>
+              <a:rPr lang="en-US" dirty="0" smtClean="0">
+                <a:solidFill>
+                  <a:schemeClr val="accent1"/>
+                </a:solidFill>
+              </a:rPr>
+              <a:t>Introduction</a:t>
+            </a:r>
+          </a:p>
+          <a:p>
+            <a:r>
+              <a:rPr lang="en-US" dirty="0" smtClean="0">
+                <a:solidFill>
+                  <a:schemeClr val="accent1"/>
+                </a:solidFill>
+              </a:rPr>
+              <a:t>Team and Acknowledgement</a:t>
+            </a:r>
+          </a:p>
+          <a:p>
+            <a:r>
+              <a:rPr lang="en-US" dirty="0" smtClean="0">
+                <a:solidFill>
+                  <a:schemeClr val="accent1"/>
+                </a:solidFill>
+              </a:rPr>
+              <a:t>Requirements Analysis</a:t>
+            </a:r>
+          </a:p>
+          <a:p>
+            <a:r>
+              <a:rPr lang="en-US" dirty="0" smtClean="0">
+                <a:solidFill>
+                  <a:schemeClr val="accent1"/>
+                </a:solidFill>
+              </a:rPr>
+              <a:t>Use Case Modeling</a:t>
+            </a:r>
+          </a:p>
+          <a:p>
+            <a:r>
+              <a:rPr lang="en-US" dirty="0" smtClean="0">
+                <a:solidFill>
+                  <a:schemeClr val="accent1"/>
+                </a:solidFill>
+              </a:rPr>
+              <a:t>Sequence Diagrams</a:t>
+            </a:r>
+          </a:p>
+          <a:p>
+            <a:r>
+              <a:rPr lang="en-US" dirty="0" smtClean="0">
+                <a:solidFill>
+                  <a:schemeClr val="accent1"/>
+                </a:solidFill>
+              </a:rPr>
+              <a:t>Class Design</a:t>
+            </a:r>
+          </a:p>
+          <a:p>
+            <a:r>
+              <a:rPr lang="en-US" dirty="0" smtClean="0">
+                <a:solidFill>
+                  <a:schemeClr val="accent1"/>
+                </a:solidFill>
+              </a:rPr>
+              <a:t>Implementation</a:t>
+            </a:r>
+          </a:p>
+          <a:p>
+            <a:r>
+              <a:rPr lang="en-US" dirty="0" smtClean="0">
+                <a:solidFill>
+                  <a:schemeClr val="accent1"/>
+                </a:solidFill>
+              </a:rPr>
+              <a:t>Version Control</a:t>
+            </a:r>
+          </a:p>
+          <a:p>
+            <a:r>
+              <a:rPr lang="en-US" dirty="0" smtClean="0">
+                <a:solidFill>
+                  <a:schemeClr val="accent1"/>
+                </a:solidFill>
+              </a:rPr>
+              <a:t>Unit Testing</a:t>
+            </a:r>
+          </a:p>
+          <a:p>
+            <a:r>
+              <a:rPr lang="en-US" dirty="0" smtClean="0">
+                <a:solidFill>
+                  <a:schemeClr val="accent1"/>
+                </a:solidFill>
+              </a:rPr>
+              <a:t>Build Process</a:t>
+            </a:r>
+          </a:p>
+          <a:p>
+            <a:r>
+              <a:rPr lang="en-US" dirty="0" smtClean="0">
+                <a:solidFill>
+                  <a:schemeClr val="accent1"/>
+                </a:solidFill>
+              </a:rPr>
+              <a:t>Conclusion</a:t>
+            </a:r>
+          </a:p>
+          <a:p>
+            <a:r>
+              <a:rPr lang="en-US" dirty="0" smtClean="0">
+                <a:solidFill>
+                  <a:schemeClr val="accent1"/>
+                </a:solidFill>
+              </a:rPr>
+              <a:t>References</a:t>
+            </a:r>
+          </a:p>
+        </p:txBody>
+      </p:sp>
+    </p:spTree>
+    <p:extLst>
+      <p:ext uri="{BB962C8B-B14F-4D97-AF65-F5344CB8AC3E}">
+        <p14:creationId xmlns:p14="http://schemas.microsoft.com/office/powerpoint/2010/main" val="535251902"/>
+      </p:ext>
+    </p:extLst>
+  </p:cSld>
+  <p:clrMapOvr>
+    <a:masterClrMapping/>
+  </p:clrMapOvr>
+</p:sld>
+</file>
+
+<file path=ppt/slides/slide20.xml><?xml version="1.0" encoding="utf-8"?>
+<p:sld xmlns:a="http://schemas.openxmlformats.org/drawingml/2006/main" xmlns:r="http://schemas.openxmlformats.org/officeDocument/2006/relationships" xmlns:p="http://schemas.openxmlformats.org/presentationml/2006/main">
+  <p:cSld>
+    <p:spTree>
+      <p:nvGrpSpPr>
+        <p:cNvPr id="1" name=""/>
+        <p:cNvGrpSpPr/>
+        <p:nvPr/>
+      </p:nvGrpSpPr>
+      <p:grpSpPr>
+        <a:xfrm>
+          <a:off x="0" y="0"/>
+          <a:ext cx="0" cy="0"/>
+          <a:chOff x="0" y="0"/>
+          <a:chExt cx="0" cy="0"/>
+        </a:xfrm>
+      </p:grpSpPr>
+      <p:sp>
+        <p:nvSpPr>
+          <p:cNvPr id="2" name="Title 1"/>
+          <p:cNvSpPr>
+            <a:spLocks noGrp="1"/>
+          </p:cNvSpPr>
+          <p:nvPr>
+            <p:ph type="title"/>
+          </p:nvPr>
+        </p:nvSpPr>
+        <p:spPr/>
+        <p:txBody>
+          <a:bodyPr/>
+          <a:lstStyle/>
+          <a:p>
+            <a:r>
+              <a:rPr lang="en-US" dirty="0" smtClean="0">
+                <a:solidFill>
+                  <a:schemeClr val="tx2"/>
+                </a:solidFill>
+              </a:rPr>
+              <a:t>Key Elements</a:t>
+            </a:r>
+            <a:endParaRPr lang="en-US" dirty="0">
+              <a:solidFill>
+                <a:schemeClr val="tx2"/>
+              </a:solidFill>
+            </a:endParaRPr>
+          </a:p>
+        </p:txBody>
+      </p:sp>
+      <p:sp>
+        <p:nvSpPr>
+          <p:cNvPr id="3" name="Content Placeholder 2"/>
+          <p:cNvSpPr>
+            <a:spLocks noGrp="1"/>
+          </p:cNvSpPr>
+          <p:nvPr>
+            <p:ph idx="1"/>
+          </p:nvPr>
+        </p:nvSpPr>
+        <p:spPr/>
+        <p:txBody>
+          <a:bodyPr>
+            <a:normAutofit fontScale="92500"/>
+          </a:bodyPr>
+          <a:lstStyle/>
+          <a:p>
+            <a:r>
+              <a:rPr lang="en-US" b="1" dirty="0">
+                <a:solidFill>
+                  <a:schemeClr val="tx2"/>
+                </a:solidFill>
+              </a:rPr>
+              <a:t>Class</a:t>
+            </a:r>
+            <a:r>
+              <a:rPr lang="en-US" dirty="0">
+                <a:solidFill>
+                  <a:schemeClr val="tx2"/>
+                </a:solidFill>
+              </a:rPr>
+              <a:t> – A blueprint for objects (e.g., Customer, Order).</a:t>
+            </a:r>
+          </a:p>
+          <a:p>
+            <a:pPr lvl="1"/>
+            <a:r>
+              <a:rPr lang="en-US" b="1" dirty="0">
+                <a:solidFill>
+                  <a:schemeClr val="tx2"/>
+                </a:solidFill>
+              </a:rPr>
+              <a:t>Attributes</a:t>
+            </a:r>
+            <a:r>
+              <a:rPr lang="en-US" dirty="0">
+                <a:solidFill>
+                  <a:schemeClr val="tx2"/>
+                </a:solidFill>
+              </a:rPr>
+              <a:t> (Variables: name, id)</a:t>
+            </a:r>
+          </a:p>
+          <a:p>
+            <a:pPr lvl="1"/>
+            <a:r>
+              <a:rPr lang="en-US" b="1" dirty="0">
+                <a:solidFill>
+                  <a:schemeClr val="tx2"/>
+                </a:solidFill>
+              </a:rPr>
+              <a:t>Methods</a:t>
+            </a:r>
+            <a:r>
+              <a:rPr lang="en-US" dirty="0">
+                <a:solidFill>
+                  <a:schemeClr val="tx2"/>
+                </a:solidFill>
+              </a:rPr>
+              <a:t> (Functions: </a:t>
+            </a:r>
+            <a:r>
+              <a:rPr lang="en-US" dirty="0" err="1">
+                <a:solidFill>
+                  <a:schemeClr val="tx2"/>
+                </a:solidFill>
+              </a:rPr>
+              <a:t>placeOrder</a:t>
+            </a:r>
+            <a:r>
+              <a:rPr lang="en-US" dirty="0">
+                <a:solidFill>
+                  <a:schemeClr val="tx2"/>
+                </a:solidFill>
+              </a:rPr>
+              <a:t>(), </a:t>
+            </a:r>
+            <a:r>
+              <a:rPr lang="en-US" dirty="0" err="1">
+                <a:solidFill>
+                  <a:schemeClr val="tx2"/>
+                </a:solidFill>
+              </a:rPr>
+              <a:t>cancelOrder</a:t>
+            </a:r>
+            <a:r>
+              <a:rPr lang="en-US" dirty="0">
+                <a:solidFill>
+                  <a:schemeClr val="tx2"/>
+                </a:solidFill>
+              </a:rPr>
+              <a:t>())</a:t>
+            </a:r>
+          </a:p>
+          <a:p>
+            <a:r>
+              <a:rPr lang="en-US" b="1" dirty="0">
+                <a:solidFill>
+                  <a:schemeClr val="tx2"/>
+                </a:solidFill>
+              </a:rPr>
+              <a:t>Relationships</a:t>
+            </a:r>
+            <a:r>
+              <a:rPr lang="en-US" dirty="0">
+                <a:solidFill>
+                  <a:schemeClr val="tx2"/>
+                </a:solidFill>
+              </a:rPr>
+              <a:t> – How classes interact:</a:t>
+            </a:r>
+          </a:p>
+          <a:p>
+            <a:pPr lvl="1"/>
+            <a:r>
+              <a:rPr lang="en-US" b="1" dirty="0">
+                <a:solidFill>
+                  <a:schemeClr val="tx2"/>
+                </a:solidFill>
+              </a:rPr>
+              <a:t>Association</a:t>
+            </a:r>
+            <a:r>
+              <a:rPr lang="en-US" dirty="0">
+                <a:solidFill>
+                  <a:schemeClr val="tx2"/>
+                </a:solidFill>
+              </a:rPr>
+              <a:t> (e.g., Customer → Order)</a:t>
+            </a:r>
+          </a:p>
+          <a:p>
+            <a:pPr lvl="1"/>
+            <a:r>
+              <a:rPr lang="en-US" b="1" dirty="0">
+                <a:solidFill>
+                  <a:schemeClr val="tx2"/>
+                </a:solidFill>
+              </a:rPr>
+              <a:t>Inheritance</a:t>
+            </a:r>
+            <a:r>
+              <a:rPr lang="en-US" dirty="0">
+                <a:solidFill>
+                  <a:schemeClr val="tx2"/>
+                </a:solidFill>
+              </a:rPr>
+              <a:t> (e.g., Admin </a:t>
+            </a:r>
+            <a:r>
+              <a:rPr lang="en-US" b="1" dirty="0">
+                <a:solidFill>
+                  <a:schemeClr val="tx2"/>
+                </a:solidFill>
+              </a:rPr>
+              <a:t>extends</a:t>
+            </a:r>
+            <a:r>
+              <a:rPr lang="en-US" dirty="0">
+                <a:solidFill>
+                  <a:schemeClr val="tx2"/>
+                </a:solidFill>
+              </a:rPr>
+              <a:t> User)</a:t>
+            </a:r>
+          </a:p>
+          <a:p>
+            <a:pPr lvl="1"/>
+            <a:r>
+              <a:rPr lang="en-US" b="1" dirty="0">
+                <a:solidFill>
+                  <a:schemeClr val="tx2"/>
+                </a:solidFill>
+              </a:rPr>
+              <a:t>Aggregation/Composition</a:t>
+            </a:r>
+            <a:r>
+              <a:rPr lang="en-US" dirty="0">
+                <a:solidFill>
+                  <a:schemeClr val="tx2"/>
+                </a:solidFill>
+              </a:rPr>
+              <a:t> (e.g., Library </a:t>
+            </a:r>
+            <a:r>
+              <a:rPr lang="en-US" b="1" dirty="0">
+                <a:solidFill>
+                  <a:schemeClr val="tx2"/>
+                </a:solidFill>
+              </a:rPr>
+              <a:t>has</a:t>
+            </a:r>
+            <a:r>
+              <a:rPr lang="en-US" dirty="0">
+                <a:solidFill>
+                  <a:schemeClr val="tx2"/>
+                </a:solidFill>
+              </a:rPr>
+              <a:t> Books)</a:t>
+            </a:r>
+          </a:p>
+          <a:p>
+            <a:r>
+              <a:rPr lang="en-US" b="1" dirty="0">
+                <a:solidFill>
+                  <a:schemeClr val="tx2"/>
+                </a:solidFill>
+              </a:rPr>
+              <a:t>Multiplicity</a:t>
+            </a:r>
+            <a:r>
+              <a:rPr lang="en-US" dirty="0">
+                <a:solidFill>
+                  <a:schemeClr val="tx2"/>
+                </a:solidFill>
+              </a:rPr>
+              <a:t> – Indicates quantity (e.g., 1..*, 0..1).</a:t>
+            </a:r>
+          </a:p>
+          <a:p>
+            <a:endParaRPr lang="en-US" dirty="0"/>
+          </a:p>
+        </p:txBody>
+      </p:sp>
+    </p:spTree>
+    <p:extLst>
+      <p:ext uri="{BB962C8B-B14F-4D97-AF65-F5344CB8AC3E}">
+        <p14:creationId xmlns:p14="http://schemas.microsoft.com/office/powerpoint/2010/main" val="308725265"/>
+      </p:ext>
+    </p:extLst>
+  </p:cSld>
+  <p:clrMapOvr>
+    <a:masterClrMapping/>
+  </p:clrMapOvr>
+</p:sld>
+</file>
+
+<file path=ppt/slides/slide21.xml><?xml version="1.0" encoding="utf-8"?>
 <p:sld xmlns:a="http://schemas.openxmlformats.org/drawingml/2006/main" xmlns:r="http://schemas.openxmlformats.org/officeDocument/2006/relationships" xmlns:p="http://schemas.openxmlformats.org/presentationml/2006/main">
   <p:cSld>
     <p:spTree>
@@ -3797,7 +4891,7 @@
 </p:sld>
 </file>
 
-<file path=ppt/slides/slide15.xml><?xml version="1.0" encoding="utf-8"?>
+<file path=ppt/slides/slide22.xml><?xml version="1.0" encoding="utf-8"?>
 <p:sld xmlns:a="http://schemas.openxmlformats.org/drawingml/2006/main" xmlns:r="http://schemas.openxmlformats.org/officeDocument/2006/relationships" xmlns:p="http://schemas.openxmlformats.org/presentationml/2006/main">
   <p:cSld>
     <p:spTree>
@@ -3946,7 +5040,7 @@
 </p:sld>
 </file>
 
-<file path=ppt/slides/slide16.xml><?xml version="1.0" encoding="utf-8"?>
+<file path=ppt/slides/slide23.xml><?xml version="1.0" encoding="utf-8"?>
 <p:sld xmlns:a="http://schemas.openxmlformats.org/drawingml/2006/main" xmlns:r="http://schemas.openxmlformats.org/officeDocument/2006/relationships" xmlns:p="http://schemas.openxmlformats.org/presentationml/2006/main">
   <p:cSld>
     <p:spTree>
@@ -4025,7 +5119,7 @@
 </p:sld>
 </file>
 
-<file path=ppt/slides/slide17.xml><?xml version="1.0" encoding="utf-8"?>
+<file path=ppt/slides/slide24.xml><?xml version="1.0" encoding="utf-8"?>
 <p:sld xmlns:a="http://schemas.openxmlformats.org/drawingml/2006/main" xmlns:r="http://schemas.openxmlformats.org/officeDocument/2006/relationships" xmlns:p="http://schemas.openxmlformats.org/presentationml/2006/main">
   <p:cSld>
     <p:spTree>
@@ -4104,7 +5198,7 @@
 </p:sld>
 </file>
 
-<file path=ppt/slides/slide18.xml><?xml version="1.0" encoding="utf-8"?>
+<file path=ppt/slides/slide25.xml><?xml version="1.0" encoding="utf-8"?>
 <p:sld xmlns:a="http://schemas.openxmlformats.org/drawingml/2006/main" xmlns:r="http://schemas.openxmlformats.org/officeDocument/2006/relationships" xmlns:p="http://schemas.openxmlformats.org/presentationml/2006/main">
   <p:cSld>
     <p:spTree>
@@ -4182,64 +5276,16 @@
                   <a:schemeClr val="accent1"/>
                 </a:solidFill>
               </a:rPr>
-              <a:t>Tools: </a:t>
-            </a:r>
-            <a:r>
-              <a:rPr lang="en-US" b="1" dirty="0" err="1" smtClean="0">
-                <a:solidFill>
-                  <a:schemeClr val="accent1"/>
-                </a:solidFill>
-              </a:rPr>
-              <a:t>Git</a:t>
-            </a:r>
+              <a:t>Tools: Git, GitHub, Git Bash</a:t>
+            </a:r>
+          </a:p>
+          <a:p>
             <a:r>
               <a:rPr lang="en-US" b="1" dirty="0" smtClean="0">
                 <a:solidFill>
                   <a:schemeClr val="accent1"/>
                 </a:solidFill>
               </a:rPr>
-              <a:t>, </a:t>
-            </a:r>
-            <a:r>
-              <a:rPr lang="en-US" b="1" dirty="0" err="1" smtClean="0">
-                <a:solidFill>
-                  <a:schemeClr val="accent1"/>
-                </a:solidFill>
-              </a:rPr>
-              <a:t>GitHub</a:t>
-            </a:r>
-            <a:r>
-              <a:rPr lang="en-US" b="1" dirty="0" smtClean="0">
-                <a:solidFill>
-                  <a:schemeClr val="accent1"/>
-                </a:solidFill>
-              </a:rPr>
-              <a:t>, </a:t>
-            </a:r>
-            <a:r>
-              <a:rPr lang="en-US" b="1" dirty="0" err="1" smtClean="0">
-                <a:solidFill>
-                  <a:schemeClr val="accent1"/>
-                </a:solidFill>
-              </a:rPr>
-              <a:t>Git</a:t>
-            </a:r>
-            <a:r>
-              <a:rPr lang="en-US" b="1" dirty="0" smtClean="0">
-                <a:solidFill>
-                  <a:schemeClr val="accent1"/>
-                </a:solidFill>
-              </a:rPr>
-              <a:t> Bash</a:t>
-            </a:r>
-          </a:p>
-          <a:p>
-            <a:r>
-              <a:rPr lang="en-US" b="1" dirty="0" smtClean="0">
-                <a:solidFill>
-                  <a:schemeClr val="accent1"/>
-                </a:solidFill>
-              </a:rPr>
               <a:t>Workflow:</a:t>
             </a:r>
           </a:p>
@@ -4251,23 +5297,18 @@
                   <a:schemeClr val="accent1"/>
                 </a:solidFill>
               </a:rPr>
-              <a:t>Initialize </a:t>
-            </a:r>
-            <a:r>
-              <a:rPr lang="en-US" sz="2400" dirty="0" err="1" smtClean="0">
-                <a:solidFill>
-                  <a:schemeClr val="accent1"/>
-                </a:solidFill>
-              </a:rPr>
-              <a:t>Git</a:t>
-            </a:r>
+              <a:t>Initialize Git repository</a:t>
+            </a:r>
+          </a:p>
+          <a:p>
+            <a:pPr lvl="1"/>
             <a:r>
               <a:rPr lang="en-US" sz="2400" dirty="0" smtClean="0">
                 <a:solidFill>
                   <a:schemeClr val="accent1"/>
                 </a:solidFill>
               </a:rPr>
-              <a:t> repository</a:t>
+              <a:t>Create remote repository on GitHub</a:t>
             </a:r>
           </a:p>
           <a:p>
@@ -4278,21 +5319,8 @@
                   <a:schemeClr val="accent1"/>
                 </a:solidFill>
               </a:rPr>
-              <a:t>Create remote repository on </a:t>
-            </a:r>
-            <a:r>
-              <a:rPr lang="en-US" sz="2400" dirty="0" err="1" smtClean="0">
-                <a:solidFill>
-                  <a:schemeClr val="accent1"/>
-                </a:solidFill>
-              </a:rPr>
-              <a:t>GitHub</a:t>
-            </a:r>
-            <a:endParaRPr lang="en-US" sz="2400" dirty="0" smtClean="0">
-              <a:solidFill>
-                <a:schemeClr val="accent1"/>
-              </a:solidFill>
-            </a:endParaRPr>
+              <a:t>Add, commit, push changes</a:t>
+            </a:r>
           </a:p>
           <a:p>
             <a:pPr lvl="1"/>
@@ -4302,17 +5330,6 @@
                   <a:schemeClr val="accent1"/>
                 </a:solidFill>
               </a:rPr>
-              <a:t>Add, commit, push changes</a:t>
-            </a:r>
-          </a:p>
-          <a:p>
-            <a:pPr lvl="1"/>
-            <a:r>
-              <a:rPr lang="en-US" sz="2400" dirty="0" smtClean="0">
-                <a:solidFill>
-                  <a:schemeClr val="accent1"/>
-                </a:solidFill>
-              </a:rPr>
               <a:t>Pull requests and code reviews</a:t>
             </a:r>
           </a:p>
@@ -4326,7 +5343,11 @@
               <a:t>Benefits: </a:t>
             </a:r>
             <a:r>
-              <a:rPr lang="en-US" dirty="0" smtClean="0"/>
+              <a:rPr lang="en-US" dirty="0" smtClean="0">
+                <a:solidFill>
+                  <a:schemeClr val="tx2"/>
+                </a:solidFill>
+              </a:rPr>
               <a:t>Track history, enable collaboration, revert to stable versions</a:t>
             </a:r>
           </a:p>
@@ -4348,7 +5369,7 @@
 </p:sld>
 </file>
 
-<file path=ppt/slides/slide19.xml><?xml version="1.0" encoding="utf-8"?>
+<file path=ppt/slides/slide26.xml><?xml version="1.0" encoding="utf-8"?>
 <p:sld xmlns:a="http://schemas.openxmlformats.org/drawingml/2006/main" xmlns:r="http://schemas.openxmlformats.org/officeDocument/2006/relationships" xmlns:p="http://schemas.openxmlformats.org/presentationml/2006/main">
   <p:cSld>
     <p:spTree>
@@ -4433,211 +5454,7 @@
 </p:sld>
 </file>
 
-<file path=ppt/slides/slide2.xml><?xml version="1.0" encoding="utf-8"?>
-<p:sld xmlns:a="http://schemas.openxmlformats.org/drawingml/2006/main" xmlns:r="http://schemas.openxmlformats.org/officeDocument/2006/relationships" xmlns:p="http://schemas.openxmlformats.org/presentationml/2006/main">
-  <p:cSld>
-    <p:spTree>
-      <p:nvGrpSpPr>
-        <p:cNvPr id="1" name=""/>
-        <p:cNvGrpSpPr/>
-        <p:nvPr/>
-      </p:nvGrpSpPr>
-      <p:grpSpPr>
-        <a:xfrm>
-          <a:off x="0" y="0"/>
-          <a:ext cx="0" cy="0"/>
-          <a:chOff x="0" y="0"/>
-          <a:chExt cx="0" cy="0"/>
-        </a:xfrm>
-      </p:grpSpPr>
-      <p:sp>
-        <p:nvSpPr>
-          <p:cNvPr id="2" name="Title 1"/>
-          <p:cNvSpPr>
-            <a:spLocks noGrp="1"/>
-          </p:cNvSpPr>
-          <p:nvPr>
-            <p:ph type="title"/>
-          </p:nvPr>
-        </p:nvSpPr>
-        <p:spPr/>
-        <p:txBody>
-          <a:bodyPr>
-            <a:normAutofit fontScale="90000"/>
-          </a:bodyPr>
-          <a:lstStyle/>
-          <a:p>
-            <a:r>
-              <a:rPr lang="en-US" b="1" dirty="0" smtClean="0">
-                <a:solidFill>
-                  <a:schemeClr val="accent1"/>
-                </a:solidFill>
-              </a:rPr>
-              <a:t>Presentation Outline</a:t>
-            </a:r>
-            <a:r>
-              <a:rPr lang="en-US" dirty="0" smtClean="0"/>
-              <a:t/>
-            </a:r>
-            <a:br>
-              <a:rPr lang="en-US" dirty="0" smtClean="0"/>
-            </a:br>
-            <a:endParaRPr lang="en-US" dirty="0"/>
-          </a:p>
-        </p:txBody>
-      </p:sp>
-      <p:sp>
-        <p:nvSpPr>
-          <p:cNvPr id="3" name="Content Placeholder 2"/>
-          <p:cNvSpPr>
-            <a:spLocks noGrp="1"/>
-          </p:cNvSpPr>
-          <p:nvPr>
-            <p:ph idx="1"/>
-          </p:nvPr>
-        </p:nvSpPr>
-        <p:spPr/>
-        <p:txBody>
-          <a:bodyPr>
-            <a:normAutofit fontScale="70000" lnSpcReduction="20000"/>
-          </a:bodyPr>
-          <a:lstStyle/>
-          <a:p>
-            <a:r>
-              <a:rPr lang="en-US" dirty="0" smtClean="0">
-                <a:solidFill>
-                  <a:schemeClr val="accent1"/>
-                </a:solidFill>
-              </a:rPr>
-              <a:t>Introduction</a:t>
-            </a:r>
-          </a:p>
-          <a:p>
-            <a:r>
-              <a:rPr lang="en-US" dirty="0" smtClean="0">
-                <a:solidFill>
-                  <a:schemeClr val="accent1"/>
-                </a:solidFill>
-              </a:rPr>
-              <a:t>Team and Acknowledgement</a:t>
-            </a:r>
-          </a:p>
-          <a:p>
-            <a:r>
-              <a:rPr lang="en-US" dirty="0" smtClean="0">
-                <a:solidFill>
-                  <a:schemeClr val="accent1"/>
-                </a:solidFill>
-              </a:rPr>
-              <a:t>Requirements Analysis</a:t>
-            </a:r>
-          </a:p>
-          <a:p>
-            <a:r>
-              <a:rPr lang="en-US" dirty="0" smtClean="0">
-                <a:solidFill>
-                  <a:schemeClr val="accent1"/>
-                </a:solidFill>
-              </a:rPr>
-              <a:t>Use Case Modeling</a:t>
-            </a:r>
-          </a:p>
-          <a:p>
-            <a:r>
-              <a:rPr lang="en-US" dirty="0" smtClean="0">
-                <a:solidFill>
-                  <a:schemeClr val="accent1"/>
-                </a:solidFill>
-              </a:rPr>
-              <a:t>Sequence Diagrams</a:t>
-            </a:r>
-          </a:p>
-          <a:p>
-            <a:r>
-              <a:rPr lang="en-US" dirty="0" smtClean="0">
-                <a:solidFill>
-                  <a:schemeClr val="accent1"/>
-                </a:solidFill>
-              </a:rPr>
-              <a:t>Class Design</a:t>
-            </a:r>
-          </a:p>
-          <a:p>
-            <a:r>
-              <a:rPr lang="en-US" dirty="0" smtClean="0">
-                <a:solidFill>
-                  <a:schemeClr val="accent1"/>
-                </a:solidFill>
-              </a:rPr>
-              <a:t>Implementation</a:t>
-            </a:r>
-          </a:p>
-          <a:p>
-            <a:r>
-              <a:rPr lang="en-US" dirty="0" smtClean="0">
-                <a:solidFill>
-                  <a:schemeClr val="accent1"/>
-                </a:solidFill>
-              </a:rPr>
-              <a:t>Version Control</a:t>
-            </a:r>
-          </a:p>
-          <a:p>
-            <a:r>
-              <a:rPr lang="en-US" dirty="0" smtClean="0">
-                <a:solidFill>
-                  <a:schemeClr val="accent1"/>
-                </a:solidFill>
-              </a:rPr>
-              <a:t>Unit Testing</a:t>
-            </a:r>
-          </a:p>
-          <a:p>
-            <a:r>
-              <a:rPr lang="en-US" dirty="0" smtClean="0">
-                <a:solidFill>
-                  <a:schemeClr val="accent1"/>
-                </a:solidFill>
-              </a:rPr>
-              <a:t>Build Process</a:t>
-            </a:r>
-          </a:p>
-          <a:p>
-            <a:r>
-              <a:rPr lang="en-US" dirty="0" smtClean="0">
-                <a:solidFill>
-                  <a:schemeClr val="accent1"/>
-                </a:solidFill>
-              </a:rPr>
-              <a:t>Conclusion</a:t>
-            </a:r>
-          </a:p>
-          <a:p>
-            <a:r>
-              <a:rPr lang="en-US" dirty="0" smtClean="0">
-                <a:solidFill>
-                  <a:schemeClr val="accent1"/>
-                </a:solidFill>
-              </a:rPr>
-              <a:t>References</a:t>
-            </a:r>
-          </a:p>
-        </p:txBody>
-      </p:sp>
-    </p:spTree>
-    <p:extLst>
-      <p:ext uri="{BB962C8B-B14F-4D97-AF65-F5344CB8AC3E}">
-        <p14:creationId xmlns:p14="http://schemas.microsoft.com/office/powerpoint/2010/main" val="535251902"/>
-      </p:ext>
-    </p:extLst>
-  </p:cSld>
-  <p:clrMapOvr>
-    <a:masterClrMapping/>
-  </p:clrMapOvr>
-</p:sld>
-</file>
-
-<file path=ppt/slides/slide20.xml><?xml version="1.0" encoding="utf-8"?>
+<file path=ppt/slides/slide27.xml><?xml version="1.0" encoding="utf-8"?>
 <p:sld xmlns:a="http://schemas.openxmlformats.org/drawingml/2006/main" xmlns:r="http://schemas.openxmlformats.org/officeDocument/2006/relationships" xmlns:p="http://schemas.openxmlformats.org/presentationml/2006/main">
   <p:cSld>
     <p:spTree>
@@ -4722,7 +5539,7 @@
 </p:sld>
 </file>
 
-<file path=ppt/slides/slide21.xml><?xml version="1.0" encoding="utf-8"?>
+<file path=ppt/slides/slide28.xml><?xml version="1.0" encoding="utf-8"?>
 <p:sld xmlns:a="http://schemas.openxmlformats.org/drawingml/2006/main" xmlns:r="http://schemas.openxmlformats.org/officeDocument/2006/relationships" xmlns:p="http://schemas.openxmlformats.org/presentationml/2006/main">
   <p:cSld>
     <p:spTree>
@@ -4804,33 +5621,28 @@
                   <a:schemeClr val="accent1"/>
                 </a:solidFill>
               </a:rPr>
-              <a:t>: Eclipse IDE, </a:t>
-            </a:r>
-            <a:r>
-              <a:rPr lang="en-US" dirty="0" err="1" smtClean="0">
-                <a:solidFill>
-                  <a:schemeClr val="accent1"/>
-                </a:solidFill>
-              </a:rPr>
-              <a:t>JUnit</a:t>
-            </a:r>
+              <a:t>: Eclipse IDE, JUnit 5</a:t>
+            </a:r>
+          </a:p>
+          <a:p>
+            <a:r>
+              <a:rPr lang="en-US" b="1" dirty="0" smtClean="0">
+                <a:solidFill>
+                  <a:schemeClr val="accent1"/>
+                </a:solidFill>
+              </a:rPr>
+              <a:t>Process:</a:t>
+            </a:r>
+          </a:p>
+          <a:p>
+            <a:pPr lvl="1"/>
             <a:r>
               <a:rPr lang="en-US" dirty="0" smtClean="0">
                 <a:solidFill>
                   <a:schemeClr val="accent1"/>
                 </a:solidFill>
               </a:rPr>
-              <a:t> 5</a:t>
-            </a:r>
-          </a:p>
-          <a:p>
-            <a:r>
-              <a:rPr lang="en-US" b="1" dirty="0" smtClean="0">
-                <a:solidFill>
-                  <a:schemeClr val="accent1"/>
-                </a:solidFill>
-              </a:rPr>
-              <a:t>Process:</a:t>
+              <a:t>Generate Java classes from class diagram</a:t>
             </a:r>
           </a:p>
           <a:p>
@@ -4841,34 +5653,7 @@
                   <a:schemeClr val="accent1"/>
                 </a:solidFill>
               </a:rPr>
-              <a:t>Generate Java classes from class diagram</a:t>
-            </a:r>
-          </a:p>
-          <a:p>
-            <a:pPr lvl="1"/>
-            <a:r>
-              <a:rPr lang="en-US" dirty="0" smtClean="0">
-                <a:solidFill>
-                  <a:schemeClr val="accent1"/>
-                </a:solidFill>
-              </a:rPr>
-              <a:t>Create </a:t>
-            </a:r>
-            <a:r>
-              <a:rPr lang="en-US" dirty="0" err="1" smtClean="0">
-                <a:solidFill>
-                  <a:schemeClr val="accent1"/>
-                </a:solidFill>
-              </a:rPr>
-              <a:t>JUnit</a:t>
-            </a:r>
-            <a:r>
-              <a:rPr lang="en-US" dirty="0" smtClean="0">
-                <a:solidFill>
-                  <a:schemeClr val="accent1"/>
-                </a:solidFill>
-              </a:rPr>
-              <a:t> test cases</a:t>
+              <a:t>Create JUnit test cases</a:t>
             </a:r>
           </a:p>
           <a:p>
@@ -4911,7 +5696,7 @@
 </p:sld>
 </file>
 
-<file path=ppt/slides/slide22.xml><?xml version="1.0" encoding="utf-8"?>
+<file path=ppt/slides/slide29.xml><?xml version="1.0" encoding="utf-8"?>
 <p:sld xmlns:a="http://schemas.openxmlformats.org/drawingml/2006/main" xmlns:r="http://schemas.openxmlformats.org/officeDocument/2006/relationships" xmlns:p="http://schemas.openxmlformats.org/presentationml/2006/main">
   <p:cSld>
     <p:spTree>
@@ -4992,7 +5777,194 @@
 </p:sld>
 </file>
 
-<file path=ppt/slides/slide23.xml><?xml version="1.0" encoding="utf-8"?>
+<file path=ppt/slides/slide3.xml><?xml version="1.0" encoding="utf-8"?>
+<p:sld xmlns:a="http://schemas.openxmlformats.org/drawingml/2006/main" xmlns:r="http://schemas.openxmlformats.org/officeDocument/2006/relationships" xmlns:p="http://schemas.openxmlformats.org/presentationml/2006/main">
+  <p:cSld>
+    <p:spTree>
+      <p:nvGrpSpPr>
+        <p:cNvPr id="1" name=""/>
+        <p:cNvGrpSpPr/>
+        <p:nvPr/>
+      </p:nvGrpSpPr>
+      <p:grpSpPr>
+        <a:xfrm>
+          <a:off x="0" y="0"/>
+          <a:ext cx="0" cy="0"/>
+          <a:chOff x="0" y="0"/>
+          <a:chExt cx="0" cy="0"/>
+        </a:xfrm>
+      </p:grpSpPr>
+      <p:sp>
+        <p:nvSpPr>
+          <p:cNvPr id="2" name="Title 1"/>
+          <p:cNvSpPr>
+            <a:spLocks noGrp="1"/>
+          </p:cNvSpPr>
+          <p:nvPr>
+            <p:ph type="title"/>
+          </p:nvPr>
+        </p:nvSpPr>
+        <p:spPr/>
+        <p:txBody>
+          <a:bodyPr>
+            <a:normAutofit fontScale="90000"/>
+          </a:bodyPr>
+          <a:lstStyle/>
+          <a:p>
+            <a:r>
+              <a:rPr lang="en-US" b="1" dirty="0" smtClean="0">
+                <a:solidFill>
+                  <a:schemeClr val="accent1"/>
+                </a:solidFill>
+              </a:rPr>
+              <a:t>Introduction</a:t>
+            </a:r>
+            <a:r>
+              <a:rPr lang="en-US" b="1" dirty="0" smtClean="0"/>
+              <a:t/>
+            </a:r>
+            <a:br>
+              <a:rPr lang="en-US" b="1" dirty="0" smtClean="0"/>
+            </a:br>
+            <a:endParaRPr lang="en-US" dirty="0"/>
+          </a:p>
+        </p:txBody>
+      </p:sp>
+      <p:sp>
+        <p:nvSpPr>
+          <p:cNvPr id="3" name="Content Placeholder 2"/>
+          <p:cNvSpPr>
+            <a:spLocks noGrp="1"/>
+          </p:cNvSpPr>
+          <p:nvPr>
+            <p:ph idx="1"/>
+          </p:nvPr>
+        </p:nvSpPr>
+        <p:spPr/>
+        <p:txBody>
+          <a:bodyPr>
+            <a:normAutofit fontScale="92500" lnSpcReduction="20000"/>
+          </a:bodyPr>
+          <a:lstStyle/>
+          <a:p>
+            <a:r>
+              <a:rPr lang="en-US" b="1" dirty="0" smtClean="0">
+                <a:solidFill>
+                  <a:schemeClr val="accent1"/>
+                </a:solidFill>
+              </a:rPr>
+              <a:t>Project</a:t>
+            </a:r>
+            <a:r>
+              <a:rPr lang="en-US" dirty="0" smtClean="0">
+                <a:solidFill>
+                  <a:schemeClr val="accent1"/>
+                </a:solidFill>
+              </a:rPr>
+              <a:t>: Wache-Market, a web-based e-commerce platform for Wachemo University</a:t>
+            </a:r>
+          </a:p>
+          <a:p>
+            <a:r>
+              <a:rPr lang="en-US" b="1" dirty="0" smtClean="0">
+                <a:solidFill>
+                  <a:schemeClr val="accent1"/>
+                </a:solidFill>
+              </a:rPr>
+              <a:t>Objective</a:t>
+            </a:r>
+            <a:r>
+              <a:rPr lang="en-US" dirty="0" smtClean="0">
+                <a:solidFill>
+                  <a:schemeClr val="accent1"/>
+                </a:solidFill>
+              </a:rPr>
+              <a:t>: Facilitate buying and selling within the university community</a:t>
+            </a:r>
+          </a:p>
+          <a:p>
+            <a:r>
+              <a:rPr lang="en-US" dirty="0" smtClean="0">
+                <a:solidFill>
+                  <a:schemeClr val="accent1"/>
+                </a:solidFill>
+              </a:rPr>
+              <a:t>Developed by 3rd-year Software Engineering students</a:t>
+            </a:r>
+          </a:p>
+          <a:p>
+            <a:r>
+              <a:rPr lang="en-US" b="1" dirty="0" smtClean="0">
+                <a:solidFill>
+                  <a:schemeClr val="accent1"/>
+                </a:solidFill>
+              </a:rPr>
+              <a:t>Key Features:</a:t>
+            </a:r>
+          </a:p>
+          <a:p>
+            <a:pPr lvl="1"/>
+            <a:r>
+              <a:rPr lang="en-US" dirty="0" smtClean="0">
+                <a:solidFill>
+                  <a:schemeClr val="accent1"/>
+                </a:solidFill>
+              </a:rPr>
+              <a:t>Secure user authentication</a:t>
+            </a:r>
+          </a:p>
+          <a:p>
+            <a:pPr lvl="1"/>
+            <a:r>
+              <a:rPr lang="en-US" dirty="0" smtClean="0">
+                <a:solidFill>
+                  <a:schemeClr val="accent1"/>
+                </a:solidFill>
+              </a:rPr>
+              <a:t>Flexible product listings</a:t>
+            </a:r>
+          </a:p>
+          <a:p>
+            <a:pPr lvl="1"/>
+            <a:r>
+              <a:rPr lang="en-US" dirty="0" smtClean="0">
+                <a:solidFill>
+                  <a:schemeClr val="accent1"/>
+                </a:solidFill>
+              </a:rPr>
+              <a:t>Efficient transaction processing</a:t>
+            </a:r>
+          </a:p>
+          <a:p>
+            <a:pPr lvl="1"/>
+            <a:r>
+              <a:rPr lang="en-US" dirty="0" smtClean="0">
+                <a:solidFill>
+                  <a:schemeClr val="accent1"/>
+                </a:solidFill>
+              </a:rPr>
+              <a:t>Role-based access (Buyer, Seller, Admin)</a:t>
+            </a:r>
+          </a:p>
+          <a:p>
+            <a:endParaRPr lang="en-US" dirty="0"/>
+          </a:p>
+        </p:txBody>
+      </p:sp>
+    </p:spTree>
+    <p:extLst>
+      <p:ext uri="{BB962C8B-B14F-4D97-AF65-F5344CB8AC3E}">
+        <p14:creationId xmlns:p14="http://schemas.microsoft.com/office/powerpoint/2010/main" val="1781545297"/>
+      </p:ext>
+    </p:extLst>
+  </p:cSld>
+  <p:clrMapOvr>
+    <a:masterClrMapping/>
+  </p:clrMapOvr>
+</p:sld>
+</file>
+
+<file path=ppt/slides/slide30.xml><?xml version="1.0" encoding="utf-8"?>
 <p:sld xmlns:a="http://schemas.openxmlformats.org/drawingml/2006/main" xmlns:r="http://schemas.openxmlformats.org/officeDocument/2006/relationships" xmlns:p="http://schemas.openxmlformats.org/presentationml/2006/main">
   <p:cSld>
     <p:spTree>
@@ -5077,7 +6049,7 @@
 </p:sld>
 </file>
 
-<file path=ppt/slides/slide24.xml><?xml version="1.0" encoding="utf-8"?>
+<file path=ppt/slides/slide31.xml><?xml version="1.0" encoding="utf-8"?>
 <p:sld xmlns:a="http://schemas.openxmlformats.org/drawingml/2006/main" xmlns:r="http://schemas.openxmlformats.org/officeDocument/2006/relationships" xmlns:p="http://schemas.openxmlformats.org/presentationml/2006/main">
   <p:cSld>
     <p:spTree>
@@ -5234,7 +6206,7 @@
 </p:sld>
 </file>
 
-<file path=ppt/slides/slide25.xml><?xml version="1.0" encoding="utf-8"?>
+<file path=ppt/slides/slide32.xml><?xml version="1.0" encoding="utf-8"?>
 <p:sld xmlns:a="http://schemas.openxmlformats.org/drawingml/2006/main" xmlns:r="http://schemas.openxmlformats.org/officeDocument/2006/relationships" xmlns:p="http://schemas.openxmlformats.org/presentationml/2006/main">
   <p:cSld>
     <p:spTree>
@@ -5319,7 +6291,7 @@
 </p:sld>
 </file>
 
-<file path=ppt/slides/slide26.xml><?xml version="1.0" encoding="utf-8"?>
+<file path=ppt/slides/slide33.xml><?xml version="1.0" encoding="utf-8"?>
 <p:sld xmlns:a="http://schemas.openxmlformats.org/drawingml/2006/main" xmlns:r="http://schemas.openxmlformats.org/officeDocument/2006/relationships" xmlns:p="http://schemas.openxmlformats.org/presentationml/2006/main">
   <p:cSld>
     <p:spTree>
@@ -5404,7 +6376,7 @@
 </p:sld>
 </file>
 
-<file path=ppt/slides/slide27.xml><?xml version="1.0" encoding="utf-8"?>
+<file path=ppt/slides/slide34.xml><?xml version="1.0" encoding="utf-8"?>
 <p:sld xmlns:a="http://schemas.openxmlformats.org/drawingml/2006/main" xmlns:r="http://schemas.openxmlformats.org/officeDocument/2006/relationships" xmlns:p="http://schemas.openxmlformats.org/presentationml/2006/main">
   <p:cSld>
     <p:spTree>
@@ -5509,20 +6481,12 @@
           </a:p>
           <a:p>
             <a:r>
-              <a:rPr lang="en-US" b="1" dirty="0" err="1" smtClean="0">
-                <a:solidFill>
-                  <a:schemeClr val="accent1"/>
-                </a:solidFill>
-              </a:rPr>
-              <a:t>JUnit</a:t>
-            </a:r>
-            <a:r>
               <a:rPr lang="en-US" b="1" dirty="0" smtClean="0">
                 <a:solidFill>
                   <a:schemeClr val="accent1"/>
                 </a:solidFill>
               </a:rPr>
-              <a:t>. </a:t>
+              <a:t>JUnit. </a:t>
             </a:r>
             <a:r>
               <a:rPr lang="en-US" dirty="0" smtClean="0">
@@ -5535,20 +6499,12 @@
           </a:p>
           <a:p>
             <a:r>
-              <a:rPr lang="en-US" b="1" dirty="0" err="1" smtClean="0">
-                <a:solidFill>
-                  <a:schemeClr val="accent1"/>
-                </a:solidFill>
-              </a:rPr>
-              <a:t>Git</a:t>
-            </a:r>
-            <a:r>
               <a:rPr lang="en-US" b="1" dirty="0" smtClean="0">
                 <a:solidFill>
                   <a:schemeClr val="accent1"/>
                 </a:solidFill>
               </a:rPr>
-              <a:t>. </a:t>
+              <a:t>Git. </a:t>
             </a:r>
             <a:r>
               <a:rPr lang="en-US" dirty="0" smtClean="0">
@@ -5561,7 +6517,7 @@
           </a:p>
           <a:p>
             <a:r>
-              <a:rPr lang="en-US" b="1" dirty="0" err="1" smtClean="0">
+              <a:rPr lang="en-US" b="1" dirty="0" smtClean="0">
                 <a:solidFill>
                   <a:schemeClr val="accent1"/>
                 </a:solidFill>
@@ -5602,39 +6558,7 @@
                   <a:schemeClr val="accent1"/>
                 </a:solidFill>
               </a:rPr>
-              <a:t>Course materials from Mr. </a:t>
-            </a:r>
-            <a:r>
-              <a:rPr lang="en-US" dirty="0" err="1" smtClean="0">
-                <a:solidFill>
-                  <a:schemeClr val="accent1"/>
-                </a:solidFill>
-              </a:rPr>
-              <a:t>Feyisa</a:t>
-            </a:r>
-            <a:r>
-              <a:rPr lang="en-US" dirty="0" smtClean="0">
-                <a:solidFill>
-                  <a:schemeClr val="accent1"/>
-                </a:solidFill>
-              </a:rPr>
-              <a:t> </a:t>
-            </a:r>
-            <a:r>
-              <a:rPr lang="en-US" dirty="0" err="1" smtClean="0">
-                <a:solidFill>
-                  <a:schemeClr val="accent1"/>
-                </a:solidFill>
-              </a:rPr>
-              <a:t>Kedir</a:t>
-            </a:r>
-            <a:r>
-              <a:rPr lang="en-US" dirty="0" smtClean="0">
-                <a:solidFill>
-                  <a:schemeClr val="accent1"/>
-                </a:solidFill>
-              </a:rPr>
-              <a:t>.</a:t>
+              <a:t>Course materials from Mr. Feyisa Kedir.</a:t>
             </a:r>
           </a:p>
           <a:p>
@@ -5655,7 +6579,7 @@
 </p:sld>
 </file>
 
-<file path=ppt/slides/slide3.xml><?xml version="1.0" encoding="utf-8"?>
+<file path=ppt/slides/slide35.xml><?xml version="1.0" encoding="utf-8"?>
 <p:sld xmlns:a="http://schemas.openxmlformats.org/drawingml/2006/main" xmlns:r="http://schemas.openxmlformats.org/officeDocument/2006/relationships" xmlns:p="http://schemas.openxmlformats.org/presentationml/2006/main">
   <p:cSld>
     <p:spTree>
@@ -5682,181 +6606,61 @@
             <p:ph type="title"/>
           </p:nvPr>
         </p:nvSpPr>
-        <p:spPr/>
+        <p:spPr>
+          <a:xfrm>
+            <a:off x="457200" y="274638"/>
+            <a:ext cx="8229600" cy="5745162"/>
+          </a:xfrm>
+        </p:spPr>
+        <p:txBody>
+          <a:bodyPr/>
+          <a:lstStyle/>
+          <a:p>
+            <a:r>
+              <a:rPr lang="en-US" dirty="0" smtClean="0">
+                <a:solidFill>
+                  <a:schemeClr val="tx2"/>
+                </a:solidFill>
+              </a:rPr>
+              <a:t>Thank You.</a:t>
+            </a:r>
+            <a:endParaRPr lang="en-US" dirty="0">
+              <a:solidFill>
+                <a:schemeClr val="tx2"/>
+              </a:solidFill>
+            </a:endParaRPr>
+          </a:p>
+        </p:txBody>
+      </p:sp>
+      <p:sp>
+        <p:nvSpPr>
+          <p:cNvPr id="3" name="Content Placeholder 2"/>
+          <p:cNvSpPr>
+            <a:spLocks noGrp="1"/>
+          </p:cNvSpPr>
+          <p:nvPr>
+            <p:ph idx="1"/>
+          </p:nvPr>
+        </p:nvSpPr>
+        <p:spPr>
+          <a:xfrm>
+            <a:off x="457200" y="5562600"/>
+            <a:ext cx="8229600" cy="563563"/>
+          </a:xfrm>
+        </p:spPr>
         <p:txBody>
           <a:bodyPr>
-            <a:normAutofit fontScale="90000"/>
+            <a:normAutofit lnSpcReduction="10000"/>
           </a:bodyPr>
           <a:lstStyle/>
           <a:p>
-            <a:r>
-              <a:rPr lang="en-US" b="1" dirty="0" smtClean="0">
-                <a:solidFill>
-                  <a:schemeClr val="accent1"/>
-                </a:solidFill>
-              </a:rPr>
-              <a:t>Introduction</a:t>
-            </a:r>
-            <a:r>
-              <a:rPr lang="en-US" b="1" dirty="0" smtClean="0"/>
-              <a:t/>
-            </a:r>
-            <a:br>
-              <a:rPr lang="en-US" b="1" dirty="0" smtClean="0"/>
-            </a:br>
-            <a:endParaRPr lang="en-US" dirty="0"/>
-          </a:p>
-        </p:txBody>
-      </p:sp>
-      <p:sp>
-        <p:nvSpPr>
-          <p:cNvPr id="3" name="Content Placeholder 2"/>
-          <p:cNvSpPr>
-            <a:spLocks noGrp="1"/>
-          </p:cNvSpPr>
-          <p:nvPr>
-            <p:ph idx="1"/>
-          </p:nvPr>
-        </p:nvSpPr>
-        <p:spPr/>
-        <p:txBody>
-          <a:bodyPr>
-            <a:normAutofit fontScale="92500" lnSpcReduction="20000"/>
-          </a:bodyPr>
-          <a:lstStyle/>
-          <a:p>
-            <a:r>
-              <a:rPr lang="en-US" b="1" dirty="0" smtClean="0">
-                <a:solidFill>
-                  <a:schemeClr val="accent1"/>
-                </a:solidFill>
-              </a:rPr>
-              <a:t>Project</a:t>
-            </a:r>
-            <a:r>
-              <a:rPr lang="en-US" dirty="0" smtClean="0">
-                <a:solidFill>
-                  <a:schemeClr val="accent1"/>
-                </a:solidFill>
-              </a:rPr>
-              <a:t>: </a:t>
-            </a:r>
-            <a:r>
-              <a:rPr lang="en-US" dirty="0" err="1" smtClean="0">
-                <a:solidFill>
-                  <a:schemeClr val="accent1"/>
-                </a:solidFill>
-              </a:rPr>
-              <a:t>Wache</a:t>
-            </a:r>
-            <a:r>
-              <a:rPr lang="en-US" dirty="0" smtClean="0">
-                <a:solidFill>
-                  <a:schemeClr val="accent1"/>
-                </a:solidFill>
-              </a:rPr>
-              <a:t>-Market, a web-based e-commerce platform for </a:t>
-            </a:r>
-            <a:r>
-              <a:rPr lang="en-US" dirty="0" err="1" smtClean="0">
-                <a:solidFill>
-                  <a:schemeClr val="accent1"/>
-                </a:solidFill>
-              </a:rPr>
-              <a:t>Wachemo</a:t>
-            </a:r>
-            <a:r>
-              <a:rPr lang="en-US" dirty="0" smtClean="0">
-                <a:solidFill>
-                  <a:schemeClr val="accent1"/>
-                </a:solidFill>
-              </a:rPr>
-              <a:t> University</a:t>
-            </a:r>
-          </a:p>
-          <a:p>
-            <a:r>
-              <a:rPr lang="en-US" b="1" dirty="0" smtClean="0">
-                <a:solidFill>
-                  <a:schemeClr val="accent1"/>
-                </a:solidFill>
-              </a:rPr>
-              <a:t>Objective</a:t>
-            </a:r>
-            <a:r>
-              <a:rPr lang="en-US" dirty="0" smtClean="0">
-                <a:solidFill>
-                  <a:schemeClr val="accent1"/>
-                </a:solidFill>
-              </a:rPr>
-              <a:t>: Facilitate buying and selling within the university community</a:t>
-            </a:r>
-          </a:p>
-          <a:p>
-            <a:r>
-              <a:rPr lang="en-US" dirty="0" smtClean="0">
-                <a:solidFill>
-                  <a:schemeClr val="accent1"/>
-                </a:solidFill>
-              </a:rPr>
-              <a:t>Developed by 3rd-year Software Engineering students</a:t>
-            </a:r>
-          </a:p>
-          <a:p>
-            <a:r>
-              <a:rPr lang="en-US" b="1" dirty="0" smtClean="0">
-                <a:solidFill>
-                  <a:schemeClr val="accent1"/>
-                </a:solidFill>
-              </a:rPr>
-              <a:t>Key Features:</a:t>
-            </a:r>
-          </a:p>
-          <a:p>
-            <a:pPr lvl="1"/>
-            <a:r>
-              <a:rPr lang="en-US" dirty="0" smtClean="0">
-                <a:solidFill>
-                  <a:schemeClr val="accent1"/>
-                </a:solidFill>
-              </a:rPr>
-              <a:t>Secure user authentication</a:t>
-            </a:r>
-          </a:p>
-          <a:p>
-            <a:pPr lvl="1"/>
-            <a:r>
-              <a:rPr lang="en-US" dirty="0" smtClean="0">
-                <a:solidFill>
-                  <a:schemeClr val="accent1"/>
-                </a:solidFill>
-              </a:rPr>
-              <a:t>Flexible product listings</a:t>
-            </a:r>
-          </a:p>
-          <a:p>
-            <a:pPr lvl="1"/>
-            <a:r>
-              <a:rPr lang="en-US" dirty="0" smtClean="0">
-                <a:solidFill>
-                  <a:schemeClr val="accent1"/>
-                </a:solidFill>
-              </a:rPr>
-              <a:t>Efficient transaction processing</a:t>
-            </a:r>
-          </a:p>
-          <a:p>
-            <a:pPr lvl="1"/>
-            <a:r>
-              <a:rPr lang="en-US" dirty="0" smtClean="0">
-                <a:solidFill>
-                  <a:schemeClr val="accent1"/>
-                </a:solidFill>
-              </a:rPr>
-              <a:t>Role-based access (Buyer, Seller, Admin)</a:t>
-            </a:r>
-          </a:p>
-          <a:p>
+            <a:pPr marL="0" indent="0">
+              <a:buNone/>
+            </a:pPr>
+            <a:r>
+              <a:rPr lang="en-US" dirty="0" smtClean="0"/>
+              <a:t> </a:t>
+            </a:r>
             <a:endParaRPr lang="en-US" dirty="0"/>
           </a:p>
         </p:txBody>
@@ -5864,7 +6668,7 @@
     </p:spTree>
     <p:extLst>
       <p:ext uri="{BB962C8B-B14F-4D97-AF65-F5344CB8AC3E}">
-        <p14:creationId xmlns:p14="http://schemas.microsoft.com/office/powerpoint/2010/main" val="1781545297"/>
+        <p14:creationId xmlns:p14="http://schemas.microsoft.com/office/powerpoint/2010/main" val="1113363813"/>
       </p:ext>
     </p:extLst>
   </p:cSld>
@@ -5966,57 +6770,37 @@
                   <a:schemeClr val="accent1"/>
                 </a:solidFill>
               </a:rPr>
-              <a:t>Samuel </a:t>
-            </a:r>
-            <a:r>
-              <a:rPr lang="en-US" sz="2400" dirty="0" err="1" smtClean="0">
-                <a:solidFill>
-                  <a:schemeClr val="accent1"/>
-                </a:solidFill>
-              </a:rPr>
-              <a:t>Tefera</a:t>
-            </a:r>
+              <a:t>Samuel Tefera (1501240)</a:t>
+            </a:r>
+          </a:p>
+          <a:p>
             <a:r>
               <a:rPr lang="en-US" sz="2400" dirty="0" smtClean="0">
                 <a:solidFill>
                   <a:schemeClr val="accent1"/>
                 </a:solidFill>
               </a:rPr>
-              <a:t> (1501240)</a:t>
-            </a:r>
-          </a:p>
-          <a:p>
-            <a:r>
-              <a:rPr lang="en-US" sz="2400" dirty="0" err="1" smtClean="0">
-                <a:solidFill>
-                  <a:schemeClr val="accent1"/>
-                </a:solidFill>
-              </a:rPr>
-              <a:t>Kedija</a:t>
-            </a:r>
+              <a:t>Kedija Ansha (1501019)</a:t>
+            </a:r>
+          </a:p>
+          <a:p>
             <a:r>
               <a:rPr lang="en-US" sz="2400" dirty="0" smtClean="0">
                 <a:solidFill>
                   <a:schemeClr val="accent1"/>
                 </a:solidFill>
               </a:rPr>
-              <a:t> </a:t>
-            </a:r>
-            <a:r>
-              <a:rPr lang="en-US" sz="2400" dirty="0" err="1" smtClean="0">
-                <a:solidFill>
-                  <a:schemeClr val="accent1"/>
-                </a:solidFill>
-              </a:rPr>
-              <a:t>Ansha</a:t>
-            </a:r>
+              <a:t>Angelina Melese (1501700)</a:t>
+            </a:r>
+          </a:p>
+          <a:p>
             <a:r>
               <a:rPr lang="en-US" sz="2400" dirty="0" smtClean="0">
                 <a:solidFill>
                   <a:schemeClr val="accent1"/>
                 </a:solidFill>
               </a:rPr>
-              <a:t> (1501019)</a:t>
+              <a:t>Gideon Daniel (1308207)</a:t>
             </a:r>
           </a:p>
           <a:p>
@@ -6026,59 +6810,7 @@
                   <a:schemeClr val="accent1"/>
                 </a:solidFill>
               </a:rPr>
-              <a:t>Angelina </a:t>
-            </a:r>
-            <a:r>
-              <a:rPr lang="en-US" sz="2400" dirty="0" err="1" smtClean="0">
-                <a:solidFill>
-                  <a:schemeClr val="accent1"/>
-                </a:solidFill>
-              </a:rPr>
-              <a:t>Melese</a:t>
-            </a:r>
-            <a:r>
-              <a:rPr lang="en-US" sz="2400" dirty="0" smtClean="0">
-                <a:solidFill>
-                  <a:schemeClr val="accent1"/>
-                </a:solidFill>
-              </a:rPr>
-              <a:t> (1501700)</a:t>
-            </a:r>
-          </a:p>
-          <a:p>
-            <a:r>
-              <a:rPr lang="en-US" sz="2400" dirty="0" smtClean="0">
-                <a:solidFill>
-                  <a:schemeClr val="accent1"/>
-                </a:solidFill>
-              </a:rPr>
-              <a:t>Gideon Daniel (1308207)</a:t>
-            </a:r>
-          </a:p>
-          <a:p>
-            <a:r>
-              <a:rPr lang="en-US" sz="2400" dirty="0" smtClean="0">
-                <a:solidFill>
-                  <a:schemeClr val="accent1"/>
-                </a:solidFill>
-              </a:rPr>
-              <a:t>Mohammed </a:t>
-            </a:r>
-            <a:r>
-              <a:rPr lang="en-US" sz="2400" dirty="0" err="1" smtClean="0">
-                <a:solidFill>
-                  <a:schemeClr val="accent1"/>
-                </a:solidFill>
-              </a:rPr>
-              <a:t>Belayneh</a:t>
-            </a:r>
-            <a:r>
-              <a:rPr lang="en-US" sz="2400" dirty="0" smtClean="0">
-                <a:solidFill>
-                  <a:schemeClr val="accent1"/>
-                </a:solidFill>
-              </a:rPr>
-              <a:t> (1510098)</a:t>
+              <a:t>Mohammed Belayneh (1510098)</a:t>
             </a:r>
           </a:p>
           <a:p>
@@ -6106,39 +6838,7 @@
                   <a:schemeClr val="accent1"/>
                 </a:solidFill>
               </a:rPr>
-              <a:t>Mr. </a:t>
-            </a:r>
-            <a:r>
-              <a:rPr lang="en-US" dirty="0" err="1" smtClean="0">
-                <a:solidFill>
-                  <a:schemeClr val="accent1"/>
-                </a:solidFill>
-              </a:rPr>
-              <a:t>Feyisa</a:t>
-            </a:r>
-            <a:r>
-              <a:rPr lang="en-US" dirty="0" smtClean="0">
-                <a:solidFill>
-                  <a:schemeClr val="accent1"/>
-                </a:solidFill>
-              </a:rPr>
-              <a:t> </a:t>
-            </a:r>
-            <a:r>
-              <a:rPr lang="en-US" dirty="0" err="1" smtClean="0">
-                <a:solidFill>
-                  <a:schemeClr val="accent1"/>
-                </a:solidFill>
-              </a:rPr>
-              <a:t>Kedir</a:t>
-            </a:r>
-            <a:r>
-              <a:rPr lang="en-US" dirty="0" smtClean="0">
-                <a:solidFill>
-                  <a:schemeClr val="accent1"/>
-                </a:solidFill>
-              </a:rPr>
-              <a:t> (Instructor)</a:t>
+              <a:t>Mr. Feyisa Kedir (Instructor)</a:t>
             </a:r>
           </a:p>
           <a:p>
@@ -6491,67 +7191,147 @@
         </p:nvSpPr>
         <p:spPr/>
         <p:txBody>
-          <a:bodyPr>
-            <a:normAutofit fontScale="90000"/>
-          </a:bodyPr>
-          <a:lstStyle/>
-          <a:p>
-            <a:r>
-              <a:rPr lang="en-US" b="1" dirty="0" smtClean="0">
+          <a:bodyPr/>
+          <a:lstStyle/>
+          <a:p>
+            <a:r>
+              <a:rPr lang="en-US" b="1" dirty="0">
                 <a:solidFill>
                   <a:schemeClr val="accent1"/>
                 </a:solidFill>
               </a:rPr>
               <a:t>Use Case Modeling</a:t>
             </a:r>
-            <a:r>
-              <a:rPr lang="en-US" b="1" dirty="0" smtClean="0"/>
-              <a:t/>
-            </a:r>
-            <a:br>
-              <a:rPr lang="en-US" b="1" dirty="0" smtClean="0"/>
-            </a:br>
-            <a:r>
-              <a:rPr lang="en-US" dirty="0" smtClean="0"/>
-              <a:t> </a:t>
-            </a:r>
-            <a:endParaRPr lang="en-US" dirty="0"/>
-          </a:p>
-        </p:txBody>
-      </p:sp>
-      <p:pic>
-        <p:nvPicPr>
-          <p:cNvPr id="4" name="Content Placeholder 3"/>
-          <p:cNvPicPr>
-            <a:picLocks noGrp="1" noChangeAspect="1"/>
-          </p:cNvPicPr>
+            <a:endParaRPr lang="en-US" dirty="0"/>
+          </a:p>
+        </p:txBody>
+      </p:sp>
+      <p:sp>
+        <p:nvSpPr>
+          <p:cNvPr id="3" name="Content Placeholder 2"/>
+          <p:cNvSpPr>
+            <a:spLocks noGrp="1"/>
+          </p:cNvSpPr>
           <p:nvPr>
             <p:ph idx="1"/>
           </p:nvPr>
-        </p:nvPicPr>
-        <p:blipFill>
-          <a:blip r:embed="rId2" cstate="print">
-            <a:extLst>
-              <a:ext uri="{28A0092B-C50C-407E-A947-70E740481C1C}">
-                <a14:useLocalDpi xmlns:a14="http://schemas.microsoft.com/office/drawing/2010/main" val="0"/>
-              </a:ext>
-            </a:extLst>
-          </a:blip>
-          <a:stretch>
-            <a:fillRect/>
-          </a:stretch>
-        </p:blipFill>
-        <p:spPr>
-          <a:xfrm>
-            <a:off x="1474065" y="1050346"/>
-            <a:ext cx="6222135" cy="5075818"/>
-          </a:xfrm>
-        </p:spPr>
-      </p:pic>
+        </p:nvSpPr>
+        <p:spPr/>
+        <p:txBody>
+          <a:bodyPr/>
+          <a:lstStyle/>
+          <a:p>
+            <a:r>
+              <a:rPr lang="en-US" dirty="0">
+                <a:solidFill>
+                  <a:schemeClr val="tx2"/>
+                </a:solidFill>
+              </a:rPr>
+              <a:t>A </a:t>
+            </a:r>
+            <a:r>
+              <a:rPr lang="en-US" b="1" dirty="0">
+                <a:solidFill>
+                  <a:schemeClr val="tx2"/>
+                </a:solidFill>
+              </a:rPr>
+              <a:t>Use Case Diagram</a:t>
+            </a:r>
+            <a:r>
+              <a:rPr lang="en-US" dirty="0">
+                <a:solidFill>
+                  <a:schemeClr val="tx2"/>
+                </a:solidFill>
+              </a:rPr>
+              <a:t> is a type of </a:t>
+            </a:r>
+            <a:r>
+              <a:rPr lang="en-US" b="1" dirty="0">
+                <a:solidFill>
+                  <a:schemeClr val="tx2"/>
+                </a:solidFill>
+              </a:rPr>
+              <a:t>Unified Modeling Language (UML)</a:t>
+            </a:r>
+            <a:r>
+              <a:rPr lang="en-US" dirty="0">
+                <a:solidFill>
+                  <a:schemeClr val="tx2"/>
+                </a:solidFill>
+              </a:rPr>
+              <a:t> diagram that represents the </a:t>
+            </a:r>
+            <a:r>
+              <a:rPr lang="en-US" b="1" dirty="0">
+                <a:solidFill>
+                  <a:schemeClr val="tx2"/>
+                </a:solidFill>
+              </a:rPr>
+              <a:t>interactions between users (actors) and a system</a:t>
+            </a:r>
+            <a:r>
+              <a:rPr lang="en-US" dirty="0">
+                <a:solidFill>
+                  <a:schemeClr val="tx2"/>
+                </a:solidFill>
+              </a:rPr>
+              <a:t>. It helps visualize the </a:t>
+            </a:r>
+            <a:r>
+              <a:rPr lang="en-US" b="1" dirty="0">
+                <a:solidFill>
+                  <a:schemeClr val="tx2"/>
+                </a:solidFill>
+              </a:rPr>
+              <a:t>functional requirements</a:t>
+            </a:r>
+            <a:r>
+              <a:rPr lang="en-US" dirty="0">
+                <a:solidFill>
+                  <a:schemeClr val="tx2"/>
+                </a:solidFill>
+              </a:rPr>
+              <a:t> of a system by showing </a:t>
+            </a:r>
+            <a:r>
+              <a:rPr lang="en-US" b="1" dirty="0">
+                <a:solidFill>
+                  <a:schemeClr val="tx2"/>
+                </a:solidFill>
+              </a:rPr>
+              <a:t>use cases</a:t>
+            </a:r>
+            <a:r>
+              <a:rPr lang="en-US" dirty="0">
+                <a:solidFill>
+                  <a:schemeClr val="tx2"/>
+                </a:solidFill>
+              </a:rPr>
+              <a:t> (goals or tasks) and the </a:t>
+            </a:r>
+            <a:r>
+              <a:rPr lang="en-US" b="1" dirty="0">
+                <a:solidFill>
+                  <a:schemeClr val="tx2"/>
+                </a:solidFill>
+              </a:rPr>
+              <a:t>actors</a:t>
+            </a:r>
+            <a:r>
+              <a:rPr lang="en-US" dirty="0">
+                <a:solidFill>
+                  <a:schemeClr val="tx2"/>
+                </a:solidFill>
+              </a:rPr>
+              <a:t> (users or external systems) involved.</a:t>
+            </a:r>
+          </a:p>
+        </p:txBody>
+      </p:sp>
     </p:spTree>
     <p:extLst>
       <p:ext uri="{BB962C8B-B14F-4D97-AF65-F5344CB8AC3E}">
-        <p14:creationId xmlns:p14="http://schemas.microsoft.com/office/powerpoint/2010/main" val="1610863524"/>
+        <p14:creationId xmlns:p14="http://schemas.microsoft.com/office/powerpoint/2010/main" val="381255455"/>
       </p:ext>
     </p:extLst>
   </p:cSld>
@@ -6585,68 +7365,128 @@
             <a:spLocks noGrp="1"/>
           </p:cNvSpPr>
           <p:nvPr>
-            <p:ph type="title"/>
-          </p:nvPr>
-        </p:nvSpPr>
-        <p:spPr/>
-        <p:txBody>
-          <a:bodyPr>
-            <a:normAutofit fontScale="90000"/>
-          </a:bodyPr>
-          <a:lstStyle/>
-          <a:p>
-            <a:r>
-              <a:rPr lang="en-US" b="1" dirty="0" smtClean="0">
-                <a:solidFill>
-                  <a:schemeClr val="accent1"/>
-                </a:solidFill>
-              </a:rPr>
-              <a:t>Sequence Diagrams</a:t>
-            </a:r>
-            <a:r>
-              <a:rPr lang="en-US" b="1" dirty="0" smtClean="0"/>
-              <a:t/>
-            </a:r>
-            <a:br>
-              <a:rPr lang="en-US" b="1" dirty="0" smtClean="0"/>
-            </a:br>
-            <a:endParaRPr lang="en-US" dirty="0"/>
-          </a:p>
-        </p:txBody>
-      </p:sp>
-      <p:pic>
-        <p:nvPicPr>
-          <p:cNvPr id="4" name="Content Placeholder 3"/>
-          <p:cNvPicPr>
-            <a:picLocks noGrp="1" noChangeAspect="1"/>
-          </p:cNvPicPr>
-          <p:nvPr>
-            <p:ph idx="1"/>
-          </p:nvPr>
-        </p:nvPicPr>
-        <p:blipFill>
-          <a:blip r:embed="rId2">
-            <a:extLst>
-              <a:ext uri="{28A0092B-C50C-407E-A947-70E740481C1C}">
-                <a14:useLocalDpi xmlns:a14="http://schemas.microsoft.com/office/drawing/2010/main" val="0"/>
-              </a:ext>
-            </a:extLst>
-          </a:blip>
-          <a:stretch>
-            <a:fillRect/>
-          </a:stretch>
-        </p:blipFill>
+            <p:ph type="ctrTitle"/>
+          </p:nvPr>
+        </p:nvSpPr>
         <p:spPr>
           <a:xfrm>
-            <a:off x="1423504" y="1600200"/>
-            <a:ext cx="6296992" cy="4525963"/>
+            <a:off x="685800" y="228601"/>
+            <a:ext cx="7772400" cy="2285999"/>
           </a:xfrm>
         </p:spPr>
-      </p:pic>
+        <p:txBody>
+          <a:bodyPr>
+            <a:normAutofit/>
+          </a:bodyPr>
+          <a:lstStyle/>
+          <a:p>
+            <a:r>
+              <a:rPr lang="en-US" b="1" dirty="0">
+                <a:solidFill>
+                  <a:schemeClr val="tx2"/>
+                </a:solidFill>
+              </a:rPr>
+              <a:t>Key Components of a Use Case Diagram</a:t>
+            </a:r>
+            <a:r>
+              <a:rPr lang="en-US" b="1" dirty="0"/>
+              <a:t/>
+            </a:r>
+            <a:br>
+              <a:rPr lang="en-US" b="1" dirty="0"/>
+            </a:br>
+            <a:endParaRPr lang="en-US" dirty="0"/>
+          </a:p>
+        </p:txBody>
+      </p:sp>
+      <p:sp>
+        <p:nvSpPr>
+          <p:cNvPr id="3" name="Subtitle 2"/>
+          <p:cNvSpPr>
+            <a:spLocks noGrp="1"/>
+          </p:cNvSpPr>
+          <p:nvPr>
+            <p:ph type="subTitle" idx="1"/>
+          </p:nvPr>
+        </p:nvSpPr>
+        <p:spPr>
+          <a:xfrm>
+            <a:off x="1371600" y="1981200"/>
+            <a:ext cx="6400800" cy="3657600"/>
+          </a:xfrm>
+        </p:spPr>
+        <p:txBody>
+          <a:bodyPr/>
+          <a:lstStyle/>
+          <a:p>
+            <a:pPr marL="514350" indent="-514350" algn="l">
+              <a:buFont typeface="+mj-lt"/>
+              <a:buAutoNum type="arabicPeriod"/>
+            </a:pPr>
+            <a:r>
+              <a:rPr lang="en-US" b="1" dirty="0" smtClean="0">
+                <a:solidFill>
+                  <a:schemeClr val="tx2"/>
+                </a:solidFill>
+              </a:rPr>
+              <a:t>Actors</a:t>
+            </a:r>
+          </a:p>
+          <a:p>
+            <a:pPr marL="514350" indent="-514350" algn="l">
+              <a:buFont typeface="+mj-lt"/>
+              <a:buAutoNum type="arabicPeriod"/>
+            </a:pPr>
+            <a:r>
+              <a:rPr lang="en-US" b="1" dirty="0" smtClean="0">
+                <a:solidFill>
+                  <a:schemeClr val="tx2"/>
+                </a:solidFill>
+              </a:rPr>
+              <a:t>Use cases</a:t>
+            </a:r>
+          </a:p>
+          <a:p>
+            <a:pPr marL="514350" indent="-514350" algn="l">
+              <a:buFont typeface="+mj-lt"/>
+              <a:buAutoNum type="arabicPeriod"/>
+            </a:pPr>
+            <a:r>
+              <a:rPr lang="en-US" b="1" dirty="0" smtClean="0">
+                <a:solidFill>
+                  <a:schemeClr val="tx2"/>
+                </a:solidFill>
+              </a:rPr>
+              <a:t>System Boundary</a:t>
+            </a:r>
+          </a:p>
+          <a:p>
+            <a:pPr marL="514350" indent="-514350" algn="l">
+              <a:buFont typeface="+mj-lt"/>
+              <a:buAutoNum type="arabicPeriod"/>
+            </a:pPr>
+            <a:r>
+              <a:rPr lang="en-US" b="1" dirty="0" smtClean="0">
+                <a:solidFill>
+                  <a:schemeClr val="tx2"/>
+                </a:solidFill>
+              </a:rPr>
+              <a:t>Relationships</a:t>
+            </a:r>
+          </a:p>
+          <a:p>
+            <a:pPr marL="514350" indent="-514350" algn="l">
+              <a:buFont typeface="+mj-lt"/>
+              <a:buAutoNum type="arabicPeriod"/>
+            </a:pPr>
+            <a:endParaRPr lang="en-US" dirty="0"/>
+          </a:p>
+        </p:txBody>
+      </p:sp>
     </p:spTree>
     <p:extLst>
       <p:ext uri="{BB962C8B-B14F-4D97-AF65-F5344CB8AC3E}">
-        <p14:creationId xmlns:p14="http://schemas.microsoft.com/office/powerpoint/2010/main" val="666776904"/>
+        <p14:creationId xmlns:p14="http://schemas.microsoft.com/office/powerpoint/2010/main" val="611869145"/>
       </p:ext>
     </p:extLst>
   </p:cSld>
@@ -6685,50 +7525,154 @@
         </p:nvSpPr>
         <p:spPr/>
         <p:txBody>
-          <a:bodyPr/>
-          <a:lstStyle/>
-          <a:p>
-            <a:r>
-              <a:rPr lang="en-US" dirty="0" smtClean="0"/>
-              <a:t> </a:t>
-            </a:r>
-            <a:endParaRPr lang="en-US" dirty="0"/>
-          </a:p>
-        </p:txBody>
-      </p:sp>
-      <p:pic>
-        <p:nvPicPr>
-          <p:cNvPr id="4" name="Content Placeholder 3"/>
-          <p:cNvPicPr>
-            <a:picLocks noGrp="1" noChangeAspect="1"/>
-          </p:cNvPicPr>
+          <a:bodyPr>
+            <a:normAutofit fontScale="90000"/>
+          </a:bodyPr>
+          <a:lstStyle/>
+          <a:p>
+            <a:r>
+              <a:rPr lang="en-US" b="1" dirty="0">
+                <a:solidFill>
+                  <a:schemeClr val="tx2"/>
+                </a:solidFill>
+              </a:rPr>
+              <a:t>What is a Use Case Diagram Used For?</a:t>
+            </a:r>
+            <a:r>
+              <a:rPr lang="en-US" b="1" dirty="0"/>
+              <a:t/>
+            </a:r>
+            <a:br>
+              <a:rPr lang="en-US" b="1" dirty="0"/>
+            </a:br>
+            <a:endParaRPr lang="en-US" dirty="0"/>
+          </a:p>
+        </p:txBody>
+      </p:sp>
+      <p:sp>
+        <p:nvSpPr>
+          <p:cNvPr id="3" name="Content Placeholder 2"/>
+          <p:cNvSpPr>
+            <a:spLocks noGrp="1"/>
+          </p:cNvSpPr>
           <p:nvPr>
             <p:ph idx="1"/>
           </p:nvPr>
-        </p:nvPicPr>
-        <p:blipFill>
-          <a:blip r:embed="rId2">
-            <a:extLst>
-              <a:ext uri="{28A0092B-C50C-407E-A947-70E740481C1C}">
-                <a14:useLocalDpi xmlns:a14="http://schemas.microsoft.com/office/drawing/2010/main" val="0"/>
-              </a:ext>
-            </a:extLst>
-          </a:blip>
-          <a:stretch>
-            <a:fillRect/>
-          </a:stretch>
-        </p:blipFill>
-        <p:spPr>
-          <a:xfrm>
-            <a:off x="457200" y="2046883"/>
-            <a:ext cx="8229600" cy="3632596"/>
-          </a:xfrm>
-        </p:spPr>
-      </p:pic>
+        </p:nvSpPr>
+        <p:spPr/>
+        <p:txBody>
+          <a:bodyPr/>
+          <a:lstStyle/>
+          <a:p>
+            <a:pPr marL="514350" indent="-514350">
+              <a:buFont typeface="+mj-lt"/>
+              <a:buAutoNum type="arabicPeriod"/>
+            </a:pPr>
+            <a:r>
+              <a:rPr lang="en-US" b="1" dirty="0">
+                <a:solidFill>
+                  <a:schemeClr val="tx2"/>
+                </a:solidFill>
+              </a:rPr>
+              <a:t>Requirement </a:t>
+            </a:r>
+            <a:r>
+              <a:rPr lang="en-US" b="1" dirty="0" smtClean="0">
+                <a:solidFill>
+                  <a:schemeClr val="tx2"/>
+                </a:solidFill>
+              </a:rPr>
+              <a:t>Analysis</a:t>
+            </a:r>
+          </a:p>
+          <a:p>
+            <a:pPr marL="514350" indent="-514350">
+              <a:buFont typeface="+mj-lt"/>
+              <a:buAutoNum type="arabicPeriod"/>
+            </a:pPr>
+            <a:r>
+              <a:rPr lang="en-US" b="1" dirty="0">
+                <a:solidFill>
+                  <a:schemeClr val="tx2"/>
+                </a:solidFill>
+              </a:rPr>
+              <a:t>System </a:t>
+            </a:r>
+            <a:r>
+              <a:rPr lang="en-US" b="1" dirty="0" smtClean="0">
+                <a:solidFill>
+                  <a:schemeClr val="tx2"/>
+                </a:solidFill>
+              </a:rPr>
+              <a:t>Design</a:t>
+            </a:r>
+          </a:p>
+          <a:p>
+            <a:pPr marL="514350" indent="-514350">
+              <a:buFont typeface="+mj-lt"/>
+              <a:buAutoNum type="arabicPeriod"/>
+            </a:pPr>
+            <a:r>
+              <a:rPr lang="en-US" b="1" dirty="0">
+                <a:solidFill>
+                  <a:schemeClr val="tx2"/>
+                </a:solidFill>
+              </a:rPr>
+              <a:t>Project </a:t>
+            </a:r>
+            <a:r>
+              <a:rPr lang="en-US" b="1" dirty="0" smtClean="0">
+                <a:solidFill>
+                  <a:schemeClr val="tx2"/>
+                </a:solidFill>
+              </a:rPr>
+              <a:t>Planning</a:t>
+            </a:r>
+          </a:p>
+          <a:p>
+            <a:pPr marL="514350" indent="-514350">
+              <a:buFont typeface="+mj-lt"/>
+              <a:buAutoNum type="arabicPeriod"/>
+            </a:pPr>
+            <a:r>
+              <a:rPr lang="en-US" b="1" dirty="0" smtClean="0">
+                <a:solidFill>
+                  <a:schemeClr val="tx2"/>
+                </a:solidFill>
+              </a:rPr>
+              <a:t>Documentation</a:t>
+            </a:r>
+            <a:endParaRPr lang="en-US" dirty="0" smtClean="0">
+              <a:solidFill>
+                <a:schemeClr val="tx2"/>
+              </a:solidFill>
+            </a:endParaRPr>
+          </a:p>
+          <a:p>
+            <a:pPr marL="514350" indent="-514350">
+              <a:buFont typeface="+mj-lt"/>
+              <a:buAutoNum type="arabicPeriod"/>
+            </a:pPr>
+            <a:r>
+              <a:rPr lang="en-US" b="1" dirty="0">
+                <a:solidFill>
+                  <a:schemeClr val="tx2"/>
+                </a:solidFill>
+              </a:rPr>
+              <a:t>Communication Tool</a:t>
+            </a:r>
+            <a:endParaRPr lang="en-US" dirty="0">
+              <a:solidFill>
+                <a:schemeClr val="tx2"/>
+              </a:solidFill>
+            </a:endParaRPr>
+          </a:p>
+        </p:txBody>
+      </p:sp>
     </p:spTree>
     <p:extLst>
       <p:ext uri="{BB962C8B-B14F-4D97-AF65-F5344CB8AC3E}">
-        <p14:creationId xmlns:p14="http://schemas.microsoft.com/office/powerpoint/2010/main" val="868895155"/>
+        <p14:creationId xmlns:p14="http://schemas.microsoft.com/office/powerpoint/2010/main" val="1898108322"/>
       </p:ext>
     </p:extLst>
   </p:cSld>

</xml_diff>